<commit_message>
Basic proof of concept
</commit_message>
<xml_diff>
--- a/docs/OOP structure.pptx
+++ b/docs/OOP structure.pptx
@@ -245,7 +245,7 @@
           <a:p>
             <a:fld id="{3E8134A6-9429-4598-BF88-8DA59111AE34}" type="datetimeFigureOut">
               <a:rPr lang="en-US" smtClean="0"/>
-              <a:t>25.10.23</a:t>
+              <a:t>27.10.23</a:t>
             </a:fld>
             <a:endParaRPr lang="en-US"/>
           </a:p>
@@ -415,7 +415,7 @@
           <a:p>
             <a:fld id="{3E8134A6-9429-4598-BF88-8DA59111AE34}" type="datetimeFigureOut">
               <a:rPr lang="en-US" smtClean="0"/>
-              <a:t>25.10.23</a:t>
+              <a:t>27.10.23</a:t>
             </a:fld>
             <a:endParaRPr lang="en-US"/>
           </a:p>
@@ -595,7 +595,7 @@
           <a:p>
             <a:fld id="{3E8134A6-9429-4598-BF88-8DA59111AE34}" type="datetimeFigureOut">
               <a:rPr lang="en-US" smtClean="0"/>
-              <a:t>25.10.23</a:t>
+              <a:t>27.10.23</a:t>
             </a:fld>
             <a:endParaRPr lang="en-US"/>
           </a:p>
@@ -765,7 +765,7 @@
           <a:p>
             <a:fld id="{3E8134A6-9429-4598-BF88-8DA59111AE34}" type="datetimeFigureOut">
               <a:rPr lang="en-US" smtClean="0"/>
-              <a:t>25.10.23</a:t>
+              <a:t>27.10.23</a:t>
             </a:fld>
             <a:endParaRPr lang="en-US"/>
           </a:p>
@@ -1009,7 +1009,7 @@
           <a:p>
             <a:fld id="{3E8134A6-9429-4598-BF88-8DA59111AE34}" type="datetimeFigureOut">
               <a:rPr lang="en-US" smtClean="0"/>
-              <a:t>25.10.23</a:t>
+              <a:t>27.10.23</a:t>
             </a:fld>
             <a:endParaRPr lang="en-US"/>
           </a:p>
@@ -1241,7 +1241,7 @@
           <a:p>
             <a:fld id="{3E8134A6-9429-4598-BF88-8DA59111AE34}" type="datetimeFigureOut">
               <a:rPr lang="en-US" smtClean="0"/>
-              <a:t>25.10.23</a:t>
+              <a:t>27.10.23</a:t>
             </a:fld>
             <a:endParaRPr lang="en-US"/>
           </a:p>
@@ -1608,7 +1608,7 @@
           <a:p>
             <a:fld id="{3E8134A6-9429-4598-BF88-8DA59111AE34}" type="datetimeFigureOut">
               <a:rPr lang="en-US" smtClean="0"/>
-              <a:t>25.10.23</a:t>
+              <a:t>27.10.23</a:t>
             </a:fld>
             <a:endParaRPr lang="en-US"/>
           </a:p>
@@ -1726,7 +1726,7 @@
           <a:p>
             <a:fld id="{3E8134A6-9429-4598-BF88-8DA59111AE34}" type="datetimeFigureOut">
               <a:rPr lang="en-US" smtClean="0"/>
-              <a:t>25.10.23</a:t>
+              <a:t>27.10.23</a:t>
             </a:fld>
             <a:endParaRPr lang="en-US"/>
           </a:p>
@@ -1821,7 +1821,7 @@
           <a:p>
             <a:fld id="{3E8134A6-9429-4598-BF88-8DA59111AE34}" type="datetimeFigureOut">
               <a:rPr lang="en-US" smtClean="0"/>
-              <a:t>25.10.23</a:t>
+              <a:t>27.10.23</a:t>
             </a:fld>
             <a:endParaRPr lang="en-US"/>
           </a:p>
@@ -2098,7 +2098,7 @@
           <a:p>
             <a:fld id="{3E8134A6-9429-4598-BF88-8DA59111AE34}" type="datetimeFigureOut">
               <a:rPr lang="en-US" smtClean="0"/>
-              <a:t>25.10.23</a:t>
+              <a:t>27.10.23</a:t>
             </a:fld>
             <a:endParaRPr lang="en-US"/>
           </a:p>
@@ -2355,7 +2355,7 @@
           <a:p>
             <a:fld id="{3E8134A6-9429-4598-BF88-8DA59111AE34}" type="datetimeFigureOut">
               <a:rPr lang="en-US" smtClean="0"/>
-              <a:t>25.10.23</a:t>
+              <a:t>27.10.23</a:t>
             </a:fld>
             <a:endParaRPr lang="en-US"/>
           </a:p>
@@ -2568,7 +2568,7 @@
           <a:p>
             <a:fld id="{3E8134A6-9429-4598-BF88-8DA59111AE34}" type="datetimeFigureOut">
               <a:rPr lang="en-US" smtClean="0"/>
-              <a:t>25.10.23</a:t>
+              <a:t>27.10.23</a:t>
             </a:fld>
             <a:endParaRPr lang="en-US"/>
           </a:p>
@@ -3106,6 +3106,13 @@
                 <a:t>GameObject</a:t>
               </a:r>
             </a:p>
+            <a:p>
+              <a:pPr algn="ctr"/>
+              <a:r>
+                <a:rPr lang="en-US" sz="600" b="1" noProof="1"/>
+                <a:t>(pygame.sprite.Sprite)</a:t>
+              </a:r>
+            </a:p>
           </p:txBody>
         </p:sp>
         <p:sp>
@@ -5789,21 +5796,35 @@
                     <a:schemeClr val="tx1"/>
                   </a:solidFill>
                 </a:rPr>
+                <a:t>get_joysticks()</a:t>
+              </a:r>
+            </a:p>
+            <a:p>
+              <a:pPr marL="114300" indent="-57150">
+                <a:buFont typeface="Arial" panose="020B0604020202020204" pitchFamily="34" charset="0"/>
+                <a:buChar char="•"/>
+              </a:pPr>
+              <a:r>
+                <a:rPr lang="en-US" sz="600" noProof="1">
+                  <a:solidFill>
+                    <a:schemeClr val="tx1"/>
+                  </a:solidFill>
+                </a:rPr>
+                <a:t>get_event()</a:t>
+              </a:r>
+            </a:p>
+            <a:p>
+              <a:pPr marL="114300" indent="-57150">
+                <a:buFont typeface="Arial" panose="020B0604020202020204" pitchFamily="34" charset="0"/>
+                <a:buChar char="•"/>
+              </a:pPr>
+              <a:r>
+                <a:rPr lang="en-US" sz="600" noProof="1">
+                  <a:solidFill>
+                    <a:schemeClr val="tx1"/>
+                  </a:solidFill>
+                </a:rPr>
                 <a:t>startup()</a:t>
-              </a:r>
-            </a:p>
-            <a:p>
-              <a:pPr marL="114300" indent="-57150">
-                <a:buFont typeface="Arial" panose="020B0604020202020204" pitchFamily="34" charset="0"/>
-                <a:buChar char="•"/>
-              </a:pPr>
-              <a:r>
-                <a:rPr lang="en-US" sz="600" noProof="1">
-                  <a:solidFill>
-                    <a:schemeClr val="tx1"/>
-                  </a:solidFill>
-                </a:rPr>
-                <a:t>get_event()</a:t>
               </a:r>
             </a:p>
             <a:p>
@@ -5964,6 +5985,104 @@
                 <a:buFont typeface="Arial" panose="020B0604020202020204" pitchFamily="34" charset="0"/>
                 <a:buChar char="•"/>
               </a:pPr>
+              <a:r>
+                <a:rPr lang="en-US" sz="500" noProof="1">
+                  <a:solidFill>
+                    <a:schemeClr val="tx1"/>
+                  </a:solidFill>
+                </a:rPr>
+                <a:t>done = False</a:t>
+              </a:r>
+            </a:p>
+            <a:p>
+              <a:pPr marL="114300" indent="-57150">
+                <a:buFont typeface="Arial" panose="020B0604020202020204" pitchFamily="34" charset="0"/>
+                <a:buChar char="•"/>
+              </a:pPr>
+              <a:r>
+                <a:rPr lang="en-US" sz="500" noProof="1">
+                  <a:solidFill>
+                    <a:schemeClr val="tx1"/>
+                  </a:solidFill>
+                </a:rPr>
+                <a:t>quit = False</a:t>
+              </a:r>
+            </a:p>
+            <a:p>
+              <a:pPr marL="114300" indent="-57150">
+                <a:buFont typeface="Arial" panose="020B0604020202020204" pitchFamily="34" charset="0"/>
+                <a:buChar char="•"/>
+              </a:pPr>
+              <a:r>
+                <a:rPr lang="en-US" sz="500" noProof="1">
+                  <a:solidFill>
+                    <a:schemeClr val="tx1"/>
+                  </a:solidFill>
+                </a:rPr>
+                <a:t>next_state: str = None</a:t>
+              </a:r>
+            </a:p>
+            <a:p>
+              <a:pPr marL="114300" indent="-57150">
+                <a:buFont typeface="Arial" panose="020B0604020202020204" pitchFamily="34" charset="0"/>
+                <a:buChar char="•"/>
+              </a:pPr>
+              <a:r>
+                <a:rPr lang="en-US" sz="500" noProof="1">
+                  <a:solidFill>
+                    <a:schemeClr val="tx1"/>
+                  </a:solidFill>
+                </a:rPr>
+                <a:t>screen_rect = pg.disp…</a:t>
+              </a:r>
+            </a:p>
+            <a:p>
+              <a:pPr marL="114300" indent="-57150">
+                <a:buFont typeface="Arial" panose="020B0604020202020204" pitchFamily="34" charset="0"/>
+                <a:buChar char="•"/>
+              </a:pPr>
+              <a:r>
+                <a:rPr lang="en-US" sz="500" noProof="1">
+                  <a:solidFill>
+                    <a:schemeClr val="accent6">
+                      <a:lumMod val="50000"/>
+                    </a:schemeClr>
+                  </a:solidFill>
+                </a:rPr>
+                <a:t>next_state = “GAME_OVER”</a:t>
+              </a:r>
+            </a:p>
+            <a:p>
+              <a:pPr marL="114300" indent="-57150">
+                <a:buFont typeface="Arial" panose="020B0604020202020204" pitchFamily="34" charset="0"/>
+                <a:buChar char="•"/>
+              </a:pPr>
+              <a:r>
+                <a:rPr lang="en-US" sz="500" noProof="1">
+                  <a:solidFill>
+                    <a:schemeClr val="accent6">
+                      <a:lumMod val="50000"/>
+                    </a:schemeClr>
+                  </a:solidFill>
+                </a:rPr>
+                <a:t>current_level: int: 1</a:t>
+              </a:r>
+            </a:p>
+            <a:p>
+              <a:pPr marL="114300" indent="-57150">
+                <a:buFont typeface="Arial" panose="020B0604020202020204" pitchFamily="34" charset="0"/>
+                <a:buChar char="•"/>
+              </a:pPr>
+              <a:r>
+                <a:rPr lang="en-US" sz="500" b="1" noProof="1">
+                  <a:solidFill>
+                    <a:schemeClr val="accent6">
+                      <a:lumMod val="50000"/>
+                    </a:schemeClr>
+                  </a:solidFill>
+                </a:rPr>
+                <a:t>level = Level(current_level)</a:t>
+              </a:r>
               <a:endParaRPr lang="en-US" sz="500" b="1" noProof="1">
                 <a:solidFill>
                   <a:schemeClr val="tx1"/>
@@ -5975,34 +6094,11 @@
                 <a:buFont typeface="Arial" panose="020B0604020202020204" pitchFamily="34" charset="0"/>
                 <a:buChar char="•"/>
               </a:pPr>
-              <a:r>
-                <a:rPr lang="en-US" sz="500" noProof="1">
-                  <a:solidFill>
-                    <a:schemeClr val="tx1"/>
-                  </a:solidFill>
-                </a:rPr>
-                <a:t>next: str = “GAME_OVER”</a:t>
-              </a:r>
-            </a:p>
-            <a:p>
-              <a:pPr marL="530152" indent="-355102">
-                <a:buFont typeface="Arial" panose="020B0604020202020204" pitchFamily="34" charset="0"/>
-                <a:buChar char="•"/>
-              </a:pPr>
               <a:endParaRPr lang="en-US" sz="500" noProof="1">
                 <a:solidFill>
-                  <a:schemeClr val="tx1"/>
-                </a:solidFill>
-              </a:endParaRPr>
-            </a:p>
-            <a:p>
-              <a:pPr marL="530152" indent="-355102">
-                <a:buFont typeface="Arial" panose="020B0604020202020204" pitchFamily="34" charset="0"/>
-                <a:buChar char="•"/>
-              </a:pPr>
-              <a:endParaRPr lang="en-US" sz="500" noProof="1">
-                <a:solidFill>
-                  <a:schemeClr val="tx1"/>
+                  <a:schemeClr val="accent6">
+                    <a:lumMod val="50000"/>
+                  </a:schemeClr>
                 </a:solidFill>
               </a:endParaRPr>
             </a:p>
@@ -6057,13 +6153,144 @@
                 <a:buChar char="•"/>
               </a:pPr>
               <a:r>
-                <a:rPr lang="en-US" sz="600" noProof="1">
+                <a:rPr lang="en-US" sz="500" noProof="1">
                   <a:solidFill>
                     <a:schemeClr val="tx1"/>
                   </a:solidFill>
                 </a:rPr>
+                <a:t>get_joysticks()</a:t>
+              </a:r>
+            </a:p>
+            <a:p>
+              <a:pPr marL="114300" indent="-57150">
+                <a:buFont typeface="Arial" panose="020B0604020202020204" pitchFamily="34" charset="0"/>
+                <a:buChar char="•"/>
+              </a:pPr>
+              <a:r>
+                <a:rPr lang="en-US" sz="500" noProof="1">
+                  <a:solidFill>
+                    <a:schemeClr val="accent6">
+                      <a:lumMod val="50000"/>
+                    </a:schemeClr>
+                  </a:solidFill>
+                </a:rPr>
+                <a:t>get_event() calls </a:t>
+              </a:r>
+              <a:r>
+                <a:rPr lang="en-US" sz="500" b="1" noProof="1">
+                  <a:solidFill>
+                    <a:schemeClr val="accent6">
+                      <a:lumMod val="50000"/>
+                    </a:schemeClr>
+                  </a:solidFill>
+                </a:rPr>
+                <a:t>level</a:t>
+              </a:r>
+            </a:p>
+            <a:p>
+              <a:pPr marL="114300" indent="-57150">
+                <a:buFont typeface="Arial" panose="020B0604020202020204" pitchFamily="34" charset="0"/>
+                <a:buChar char="•"/>
+              </a:pPr>
+              <a:r>
+                <a:rPr lang="en-US" sz="500" noProof="1">
+                  <a:solidFill>
+                    <a:schemeClr val="tx1"/>
+                  </a:solidFill>
+                </a:rPr>
                 <a:t>startup()</a:t>
               </a:r>
+            </a:p>
+            <a:p>
+              <a:pPr marL="114300" indent="-57150">
+                <a:buFont typeface="Arial" panose="020B0604020202020204" pitchFamily="34" charset="0"/>
+                <a:buChar char="•"/>
+              </a:pPr>
+              <a:r>
+                <a:rPr lang="en-US" sz="500" noProof="1">
+                  <a:solidFill>
+                    <a:schemeClr val="accent6">
+                      <a:lumMod val="50000"/>
+                    </a:schemeClr>
+                  </a:solidFill>
+                </a:rPr>
+                <a:t>update() calls </a:t>
+              </a:r>
+              <a:r>
+                <a:rPr lang="en-US" sz="500" b="1" noProof="1">
+                  <a:solidFill>
+                    <a:schemeClr val="accent6">
+                      <a:lumMod val="50000"/>
+                    </a:schemeClr>
+                  </a:solidFill>
+                </a:rPr>
+                <a:t>level</a:t>
+              </a:r>
+            </a:p>
+            <a:p>
+              <a:pPr marL="114300" indent="-57150">
+                <a:buFont typeface="Arial" panose="020B0604020202020204" pitchFamily="34" charset="0"/>
+                <a:buChar char="•"/>
+              </a:pPr>
+              <a:r>
+                <a:rPr lang="en-US" sz="500" noProof="1">
+                  <a:solidFill>
+                    <a:schemeClr val="accent6">
+                      <a:lumMod val="50000"/>
+                    </a:schemeClr>
+                  </a:solidFill>
+                </a:rPr>
+                <a:t>draw() calls </a:t>
+              </a:r>
+              <a:r>
+                <a:rPr lang="en-US" sz="500" b="1" noProof="1">
+                  <a:solidFill>
+                    <a:schemeClr val="accent6">
+                      <a:lumMod val="50000"/>
+                    </a:schemeClr>
+                  </a:solidFill>
+                </a:rPr>
+                <a:t>level</a:t>
+              </a:r>
+            </a:p>
+            <a:p>
+              <a:pPr marL="114300" indent="-57150">
+                <a:buFont typeface="Arial" panose="020B0604020202020204" pitchFamily="34" charset="0"/>
+                <a:buChar char="•"/>
+              </a:pPr>
+              <a:endParaRPr lang="en-US" sz="500" noProof="1">
+                <a:solidFill>
+                  <a:schemeClr val="accent6">
+                    <a:lumMod val="50000"/>
+                  </a:schemeClr>
+                </a:solidFill>
+              </a:endParaRPr>
+            </a:p>
+            <a:p>
+              <a:pPr marL="114300" indent="-57150">
+                <a:buFont typeface="Arial" panose="020B0604020202020204" pitchFamily="34" charset="0"/>
+                <a:buChar char="•"/>
+              </a:pPr>
+              <a:endParaRPr lang="en-US" sz="500" noProof="1">
+                <a:solidFill>
+                  <a:schemeClr val="accent6">
+                    <a:lumMod val="50000"/>
+                  </a:schemeClr>
+                </a:solidFill>
+              </a:endParaRPr>
+            </a:p>
+            <a:p>
+              <a:pPr marL="114300" indent="-57150">
+                <a:buFont typeface="Arial" panose="020B0604020202020204" pitchFamily="34" charset="0"/>
+                <a:buChar char="•"/>
+              </a:pPr>
+              <a:endParaRPr lang="en-US" sz="200" noProof="1">
+                <a:solidFill>
+                  <a:schemeClr val="accent6">
+                    <a:lumMod val="50000"/>
+                  </a:schemeClr>
+                </a:solidFill>
+              </a:endParaRPr>
             </a:p>
           </p:txBody>
         </p:sp>
@@ -6187,6 +6414,73 @@
                 <a:buFont typeface="Arial" panose="020B0604020202020204" pitchFamily="34" charset="0"/>
                 <a:buChar char="•"/>
               </a:pPr>
+              <a:endParaRPr lang="en-US" sz="500" b="1" noProof="1">
+                <a:solidFill>
+                  <a:schemeClr val="tx1"/>
+                </a:solidFill>
+              </a:endParaRPr>
+            </a:p>
+            <a:p>
+              <a:pPr marL="114300" indent="-57150">
+                <a:buFont typeface="Arial" panose="020B0604020202020204" pitchFamily="34" charset="0"/>
+                <a:buChar char="•"/>
+              </a:pPr>
+              <a:r>
+                <a:rPr lang="en-US" sz="500" noProof="1">
+                  <a:solidFill>
+                    <a:schemeClr val="tx1"/>
+                  </a:solidFill>
+                </a:rPr>
+                <a:t>done: bool = False</a:t>
+              </a:r>
+            </a:p>
+            <a:p>
+              <a:pPr marL="114300" indent="-57150">
+                <a:buFont typeface="Arial" panose="020B0604020202020204" pitchFamily="34" charset="0"/>
+                <a:buChar char="•"/>
+              </a:pPr>
+              <a:r>
+                <a:rPr lang="en-US" sz="500" noProof="1">
+                  <a:solidFill>
+                    <a:schemeClr val="tx1"/>
+                  </a:solidFill>
+                </a:rPr>
+                <a:t>quit: bool = False</a:t>
+              </a:r>
+            </a:p>
+            <a:p>
+              <a:pPr marL="114300" indent="-57150">
+                <a:buFont typeface="Arial" panose="020B0604020202020204" pitchFamily="34" charset="0"/>
+                <a:buChar char="•"/>
+              </a:pPr>
+              <a:r>
+                <a:rPr lang="en-US" sz="500" noProof="1">
+                  <a:solidFill>
+                    <a:schemeClr val="tx1"/>
+                  </a:solidFill>
+                </a:rPr>
+                <a:t>next_state: str = None</a:t>
+              </a:r>
+            </a:p>
+            <a:p>
+              <a:pPr marL="114300" indent="-57150">
+                <a:buFont typeface="Arial" panose="020B0604020202020204" pitchFamily="34" charset="0"/>
+                <a:buChar char="•"/>
+              </a:pPr>
+              <a:r>
+                <a:rPr lang="en-US" sz="500" noProof="1">
+                  <a:solidFill>
+                    <a:schemeClr val="tx1"/>
+                  </a:solidFill>
+                </a:rPr>
+                <a:t>screen_rect = pg.disp…</a:t>
+              </a:r>
+            </a:p>
+            <a:p>
+              <a:pPr marL="114300" indent="-57150">
+                <a:buFont typeface="Arial" panose="020B0604020202020204" pitchFamily="34" charset="0"/>
+                <a:buChar char="•"/>
+              </a:pPr>
               <a:endParaRPr lang="en-US" sz="500" noProof="1">
                 <a:solidFill>
                   <a:schemeClr val="tx1"/>
@@ -6201,7 +6495,9 @@
               <a:r>
                 <a:rPr lang="en-US" sz="500" noProof="1">
                   <a:solidFill>
-                    <a:schemeClr val="tx1"/>
+                    <a:schemeClr val="accent6">
+                      <a:lumMod val="50000"/>
+                    </a:schemeClr>
                   </a:solidFill>
                 </a:rPr>
                 <a:t>next: str = “MENU”</a:t>
@@ -6302,12 +6598,68 @@
                 <a:buChar char="•"/>
               </a:pPr>
               <a:r>
-                <a:rPr lang="en-US" sz="600" noProof="1">
+                <a:rPr lang="en-US" sz="500" noProof="1">
                   <a:solidFill>
                     <a:schemeClr val="tx1"/>
                   </a:solidFill>
                 </a:rPr>
+                <a:t>get_joysticks()</a:t>
+              </a:r>
+            </a:p>
+            <a:p>
+              <a:pPr marL="114300" indent="-57150">
+                <a:buFont typeface="Arial" panose="020B0604020202020204" pitchFamily="34" charset="0"/>
+                <a:buChar char="•"/>
+              </a:pPr>
+              <a:r>
+                <a:rPr lang="en-US" sz="500" noProof="1">
+                  <a:solidFill>
+                    <a:schemeClr val="tx1"/>
+                  </a:solidFill>
+                </a:rPr>
+                <a:t>get_event()</a:t>
+              </a:r>
+            </a:p>
+            <a:p>
+              <a:pPr marL="114300" indent="-57150">
+                <a:buFont typeface="Arial" panose="020B0604020202020204" pitchFamily="34" charset="0"/>
+                <a:buChar char="•"/>
+              </a:pPr>
+              <a:r>
+                <a:rPr lang="en-US" sz="500" noProof="1">
+                  <a:solidFill>
+                    <a:schemeClr val="tx1"/>
+                  </a:solidFill>
+                </a:rPr>
                 <a:t>startup()</a:t>
+              </a:r>
+            </a:p>
+            <a:p>
+              <a:pPr marL="114300" indent="-57150">
+                <a:buFont typeface="Arial" panose="020B0604020202020204" pitchFamily="34" charset="0"/>
+                <a:buChar char="•"/>
+              </a:pPr>
+              <a:r>
+                <a:rPr lang="en-US" sz="500" noProof="1">
+                  <a:solidFill>
+                    <a:schemeClr val="tx1"/>
+                  </a:solidFill>
+                </a:rPr>
+                <a:t>update()</a:t>
+              </a:r>
+            </a:p>
+            <a:p>
+              <a:pPr marL="114300" indent="-57150">
+                <a:buFont typeface="Arial" panose="020B0604020202020204" pitchFamily="34" charset="0"/>
+                <a:buChar char="•"/>
+              </a:pPr>
+              <a:r>
+                <a:rPr lang="en-US" sz="500" noProof="1">
+                  <a:solidFill>
+                    <a:schemeClr val="tx1"/>
+                  </a:solidFill>
+                </a:rPr>
+                <a:t>draw()</a:t>
               </a:r>
             </a:p>
           </p:txBody>
@@ -6449,6 +6801,75 @@
                     <a:schemeClr val="tx1"/>
                   </a:solidFill>
                 </a:rPr>
+                <a:t>done: bool = False</a:t>
+              </a:r>
+            </a:p>
+            <a:p>
+              <a:pPr marL="114300" indent="-57150">
+                <a:buFont typeface="Arial" panose="020B0604020202020204" pitchFamily="34" charset="0"/>
+                <a:buChar char="•"/>
+              </a:pPr>
+              <a:r>
+                <a:rPr lang="en-US" sz="500" noProof="1">
+                  <a:solidFill>
+                    <a:schemeClr val="tx1"/>
+                  </a:solidFill>
+                </a:rPr>
+                <a:t>quit: bool = False</a:t>
+              </a:r>
+            </a:p>
+            <a:p>
+              <a:pPr marL="114300" indent="-57150">
+                <a:buFont typeface="Arial" panose="020B0604020202020204" pitchFamily="34" charset="0"/>
+                <a:buChar char="•"/>
+              </a:pPr>
+              <a:r>
+                <a:rPr lang="en-US" sz="500" noProof="1">
+                  <a:solidFill>
+                    <a:schemeClr val="tx1"/>
+                  </a:solidFill>
+                </a:rPr>
+                <a:t>next_state: str = None</a:t>
+              </a:r>
+            </a:p>
+            <a:p>
+              <a:pPr marL="114300" indent="-57150">
+                <a:buFont typeface="Arial" panose="020B0604020202020204" pitchFamily="34" charset="0"/>
+                <a:buChar char="•"/>
+              </a:pPr>
+              <a:r>
+                <a:rPr lang="en-US" sz="500" noProof="1">
+                  <a:solidFill>
+                    <a:schemeClr val="tx1"/>
+                  </a:solidFill>
+                </a:rPr>
+                <a:t>screen_rect = pg.disp…</a:t>
+              </a:r>
+            </a:p>
+            <a:p>
+              <a:pPr marL="114300" indent="-57150">
+                <a:buFont typeface="Arial" panose="020B0604020202020204" pitchFamily="34" charset="0"/>
+                <a:buChar char="•"/>
+              </a:pPr>
+              <a:endParaRPr lang="en-US" sz="500" b="1" noProof="1">
+                <a:solidFill>
+                  <a:schemeClr val="tx1"/>
+                </a:solidFill>
+              </a:endParaRPr>
+            </a:p>
+            <a:p>
+              <a:pPr marL="114300" indent="-57150">
+                <a:buFont typeface="Arial" panose="020B0604020202020204" pitchFamily="34" charset="0"/>
+                <a:buChar char="•"/>
+              </a:pPr>
+              <a:r>
+                <a:rPr lang="en-US" sz="500" noProof="1">
+                  <a:solidFill>
+                    <a:schemeClr val="accent6">
+                      <a:lumMod val="50000"/>
+                    </a:schemeClr>
+                  </a:solidFill>
+                </a:rPr>
                 <a:t>next: str = “GAMEPLAY”</a:t>
               </a:r>
             </a:p>
@@ -6536,13 +6957,74 @@
                 <a:buChar char="•"/>
               </a:pPr>
               <a:r>
-                <a:rPr lang="en-US" sz="600" noProof="1">
+                <a:rPr lang="en-US" sz="500" noProof="1">
                   <a:solidFill>
                     <a:schemeClr val="tx1"/>
                   </a:solidFill>
                 </a:rPr>
+                <a:t>get_joysticks()</a:t>
+              </a:r>
+            </a:p>
+            <a:p>
+              <a:pPr marL="114300" indent="-57150">
+                <a:buFont typeface="Arial" panose="020B0604020202020204" pitchFamily="34" charset="0"/>
+                <a:buChar char="•"/>
+              </a:pPr>
+              <a:r>
+                <a:rPr lang="en-US" sz="500" noProof="1">
+                  <a:solidFill>
+                    <a:schemeClr val="tx1"/>
+                  </a:solidFill>
+                </a:rPr>
+                <a:t>get_event()</a:t>
+              </a:r>
+            </a:p>
+            <a:p>
+              <a:pPr marL="114300" indent="-57150">
+                <a:buFont typeface="Arial" panose="020B0604020202020204" pitchFamily="34" charset="0"/>
+                <a:buChar char="•"/>
+              </a:pPr>
+              <a:r>
+                <a:rPr lang="en-US" sz="500" noProof="1">
+                  <a:solidFill>
+                    <a:schemeClr val="tx1"/>
+                  </a:solidFill>
+                </a:rPr>
                 <a:t>startup()</a:t>
               </a:r>
+            </a:p>
+            <a:p>
+              <a:pPr marL="114300" indent="-57150">
+                <a:buFont typeface="Arial" panose="020B0604020202020204" pitchFamily="34" charset="0"/>
+                <a:buChar char="•"/>
+              </a:pPr>
+              <a:r>
+                <a:rPr lang="en-US" sz="500" noProof="1">
+                  <a:solidFill>
+                    <a:schemeClr val="tx1"/>
+                  </a:solidFill>
+                </a:rPr>
+                <a:t>update()</a:t>
+              </a:r>
+            </a:p>
+            <a:p>
+              <a:pPr marL="114300" indent="-57150">
+                <a:buFont typeface="Arial" panose="020B0604020202020204" pitchFamily="34" charset="0"/>
+                <a:buChar char="•"/>
+              </a:pPr>
+              <a:r>
+                <a:rPr lang="en-US" sz="500" noProof="1">
+                  <a:solidFill>
+                    <a:schemeClr val="tx1"/>
+                  </a:solidFill>
+                </a:rPr>
+                <a:t>draw()</a:t>
+              </a:r>
+              <a:endParaRPr lang="en-US" sz="200" noProof="1">
+                <a:solidFill>
+                  <a:schemeClr val="tx1"/>
+                </a:solidFill>
+              </a:endParaRPr>
             </a:p>
           </p:txBody>
         </p:sp>
@@ -6683,6 +7165,75 @@
                     <a:schemeClr val="tx1"/>
                   </a:solidFill>
                 </a:rPr>
+                <a:t>done: bool = False</a:t>
+              </a:r>
+            </a:p>
+            <a:p>
+              <a:pPr marL="114300" indent="-57150">
+                <a:buFont typeface="Arial" panose="020B0604020202020204" pitchFamily="34" charset="0"/>
+                <a:buChar char="•"/>
+              </a:pPr>
+              <a:r>
+                <a:rPr lang="en-US" sz="500" noProof="1">
+                  <a:solidFill>
+                    <a:schemeClr val="tx1"/>
+                  </a:solidFill>
+                </a:rPr>
+                <a:t>quit: bool = False</a:t>
+              </a:r>
+            </a:p>
+            <a:p>
+              <a:pPr marL="114300" indent="-57150">
+                <a:buFont typeface="Arial" panose="020B0604020202020204" pitchFamily="34" charset="0"/>
+                <a:buChar char="•"/>
+              </a:pPr>
+              <a:r>
+                <a:rPr lang="en-US" sz="500" noProof="1">
+                  <a:solidFill>
+                    <a:schemeClr val="tx1"/>
+                  </a:solidFill>
+                </a:rPr>
+                <a:t>next_state: str = None</a:t>
+              </a:r>
+            </a:p>
+            <a:p>
+              <a:pPr marL="114300" indent="-57150">
+                <a:buFont typeface="Arial" panose="020B0604020202020204" pitchFamily="34" charset="0"/>
+                <a:buChar char="•"/>
+              </a:pPr>
+              <a:r>
+                <a:rPr lang="en-US" sz="500" noProof="1">
+                  <a:solidFill>
+                    <a:schemeClr val="tx1"/>
+                  </a:solidFill>
+                </a:rPr>
+                <a:t>screen_rect = pg.disp…</a:t>
+              </a:r>
+            </a:p>
+            <a:p>
+              <a:pPr marL="114300" indent="-57150">
+                <a:buFont typeface="Arial" panose="020B0604020202020204" pitchFamily="34" charset="0"/>
+                <a:buChar char="•"/>
+              </a:pPr>
+              <a:endParaRPr lang="en-US" sz="500" b="1" noProof="1">
+                <a:solidFill>
+                  <a:schemeClr val="tx1"/>
+                </a:solidFill>
+              </a:endParaRPr>
+            </a:p>
+            <a:p>
+              <a:pPr marL="114300" indent="-57150">
+                <a:buFont typeface="Arial" panose="020B0604020202020204" pitchFamily="34" charset="0"/>
+                <a:buChar char="•"/>
+              </a:pPr>
+              <a:r>
+                <a:rPr lang="en-US" sz="500" noProof="1">
+                  <a:solidFill>
+                    <a:schemeClr val="accent6">
+                      <a:lumMod val="50000"/>
+                    </a:schemeClr>
+                  </a:solidFill>
+                </a:rPr>
                 <a:t>next: str = “MENU”</a:t>
               </a:r>
             </a:p>
@@ -6770,13 +7321,74 @@
                 <a:buChar char="•"/>
               </a:pPr>
               <a:r>
-                <a:rPr lang="en-US" sz="600" noProof="1">
+                <a:rPr lang="en-US" sz="500" noProof="1">
                   <a:solidFill>
                     <a:schemeClr val="tx1"/>
                   </a:solidFill>
                 </a:rPr>
+                <a:t>get_joysticks()</a:t>
+              </a:r>
+            </a:p>
+            <a:p>
+              <a:pPr marL="114300" indent="-57150">
+                <a:buFont typeface="Arial" panose="020B0604020202020204" pitchFamily="34" charset="0"/>
+                <a:buChar char="•"/>
+              </a:pPr>
+              <a:r>
+                <a:rPr lang="en-US" sz="500" noProof="1">
+                  <a:solidFill>
+                    <a:schemeClr val="tx1"/>
+                  </a:solidFill>
+                </a:rPr>
+                <a:t>get_event()</a:t>
+              </a:r>
+            </a:p>
+            <a:p>
+              <a:pPr marL="114300" indent="-57150">
+                <a:buFont typeface="Arial" panose="020B0604020202020204" pitchFamily="34" charset="0"/>
+                <a:buChar char="•"/>
+              </a:pPr>
+              <a:r>
+                <a:rPr lang="en-US" sz="500" noProof="1">
+                  <a:solidFill>
+                    <a:schemeClr val="tx1"/>
+                  </a:solidFill>
+                </a:rPr>
                 <a:t>startup()</a:t>
               </a:r>
+            </a:p>
+            <a:p>
+              <a:pPr marL="114300" indent="-57150">
+                <a:buFont typeface="Arial" panose="020B0604020202020204" pitchFamily="34" charset="0"/>
+                <a:buChar char="•"/>
+              </a:pPr>
+              <a:r>
+                <a:rPr lang="en-US" sz="500" noProof="1">
+                  <a:solidFill>
+                    <a:schemeClr val="tx1"/>
+                  </a:solidFill>
+                </a:rPr>
+                <a:t>update()</a:t>
+              </a:r>
+            </a:p>
+            <a:p>
+              <a:pPr marL="114300" indent="-57150">
+                <a:buFont typeface="Arial" panose="020B0604020202020204" pitchFamily="34" charset="0"/>
+                <a:buChar char="•"/>
+              </a:pPr>
+              <a:r>
+                <a:rPr lang="en-US" sz="500" noProof="1">
+                  <a:solidFill>
+                    <a:schemeClr val="tx1"/>
+                  </a:solidFill>
+                </a:rPr>
+                <a:t>draw()</a:t>
+              </a:r>
+              <a:endParaRPr lang="en-US" sz="200" noProof="1">
+                <a:solidFill>
+                  <a:schemeClr val="tx1"/>
+                </a:solidFill>
+              </a:endParaRPr>
             </a:p>
           </p:txBody>
         </p:sp>
@@ -6961,6 +7573,326 @@
           </a:fontRef>
         </p:style>
       </p:cxnSp>
+      <p:sp>
+        <p:nvSpPr>
+          <p:cNvPr id="16" name="Rectangle 15">
+            <a:extLst>
+              <a:ext uri="{FF2B5EF4-FFF2-40B4-BE49-F238E27FC236}">
+                <a16:creationId xmlns:a16="http://schemas.microsoft.com/office/drawing/2014/main" id="{556533E4-1A94-B411-F439-3698DC995F5B}"/>
+              </a:ext>
+            </a:extLst>
+          </p:cNvPr>
+          <p:cNvSpPr/>
+          <p:nvPr/>
+        </p:nvSpPr>
+        <p:spPr>
+          <a:xfrm>
+            <a:off x="6675088" y="628650"/>
+            <a:ext cx="1931508" cy="1720850"/>
+          </a:xfrm>
+          <a:prstGeom prst="rect">
+            <a:avLst/>
+          </a:prstGeom>
+          <a:noFill/>
+          <a:ln>
+            <a:solidFill>
+              <a:schemeClr val="bg2">
+                <a:lumMod val="75000"/>
+              </a:schemeClr>
+            </a:solidFill>
+            <a:prstDash val="sysDash"/>
+          </a:ln>
+        </p:spPr>
+        <p:style>
+          <a:lnRef idx="2">
+            <a:schemeClr val="accent1">
+              <a:shade val="15000"/>
+            </a:schemeClr>
+          </a:lnRef>
+          <a:fillRef idx="1">
+            <a:schemeClr val="accent1"/>
+          </a:fillRef>
+          <a:effectRef idx="0">
+            <a:schemeClr val="accent1"/>
+          </a:effectRef>
+          <a:fontRef idx="minor">
+            <a:schemeClr val="lt1"/>
+          </a:fontRef>
+        </p:style>
+        <p:txBody>
+          <a:bodyPr rtlCol="0" anchor="t" anchorCtr="0"/>
+          <a:lstStyle/>
+          <a:p>
+            <a:pPr algn="r"/>
+            <a:r>
+              <a:rPr lang="en-US" sz="1400" i="1" dirty="0">
+                <a:solidFill>
+                  <a:schemeClr val="bg2">
+                    <a:lumMod val="75000"/>
+                  </a:schemeClr>
+                </a:solidFill>
+              </a:rPr>
+              <a:t>base.py</a:t>
+            </a:r>
+          </a:p>
+        </p:txBody>
+      </p:sp>
+      <p:sp>
+        <p:nvSpPr>
+          <p:cNvPr id="50" name="Rectangle 49">
+            <a:extLst>
+              <a:ext uri="{FF2B5EF4-FFF2-40B4-BE49-F238E27FC236}">
+                <a16:creationId xmlns:a16="http://schemas.microsoft.com/office/drawing/2014/main" id="{C1EAB64C-FF2E-4CA6-5F80-F1FC85E8D4C2}"/>
+              </a:ext>
+            </a:extLst>
+          </p:cNvPr>
+          <p:cNvSpPr/>
+          <p:nvPr/>
+        </p:nvSpPr>
+        <p:spPr>
+          <a:xfrm>
+            <a:off x="5088636" y="2546646"/>
+            <a:ext cx="1069772" cy="2020259"/>
+          </a:xfrm>
+          <a:prstGeom prst="rect">
+            <a:avLst/>
+          </a:prstGeom>
+          <a:noFill/>
+          <a:ln>
+            <a:solidFill>
+              <a:schemeClr val="bg2">
+                <a:lumMod val="75000"/>
+              </a:schemeClr>
+            </a:solidFill>
+            <a:prstDash val="sysDash"/>
+          </a:ln>
+        </p:spPr>
+        <p:style>
+          <a:lnRef idx="2">
+            <a:schemeClr val="accent1">
+              <a:shade val="15000"/>
+            </a:schemeClr>
+          </a:lnRef>
+          <a:fillRef idx="1">
+            <a:schemeClr val="accent1"/>
+          </a:fillRef>
+          <a:effectRef idx="0">
+            <a:schemeClr val="accent1"/>
+          </a:effectRef>
+          <a:fontRef idx="minor">
+            <a:schemeClr val="lt1"/>
+          </a:fontRef>
+        </p:style>
+        <p:txBody>
+          <a:bodyPr lIns="0" rIns="0" rtlCol="0" anchor="b" anchorCtr="0"/>
+          <a:lstStyle/>
+          <a:p>
+            <a:pPr algn="r"/>
+            <a:r>
+              <a:rPr lang="en-US" sz="1400" i="1" dirty="0">
+                <a:solidFill>
+                  <a:schemeClr val="bg2">
+                    <a:lumMod val="75000"/>
+                  </a:schemeClr>
+                </a:solidFill>
+              </a:rPr>
+              <a:t>gameplay.py</a:t>
+            </a:r>
+          </a:p>
+        </p:txBody>
+      </p:sp>
+      <p:sp>
+        <p:nvSpPr>
+          <p:cNvPr id="60" name="Rectangle 59">
+            <a:extLst>
+              <a:ext uri="{FF2B5EF4-FFF2-40B4-BE49-F238E27FC236}">
+                <a16:creationId xmlns:a16="http://schemas.microsoft.com/office/drawing/2014/main" id="{5B3FC895-E9BC-8031-D321-CD7C60FB86DB}"/>
+              </a:ext>
+            </a:extLst>
+          </p:cNvPr>
+          <p:cNvSpPr/>
+          <p:nvPr/>
+        </p:nvSpPr>
+        <p:spPr>
+          <a:xfrm>
+            <a:off x="6247374" y="2546646"/>
+            <a:ext cx="1069772" cy="2020259"/>
+          </a:xfrm>
+          <a:prstGeom prst="rect">
+            <a:avLst/>
+          </a:prstGeom>
+          <a:noFill/>
+          <a:ln>
+            <a:solidFill>
+              <a:schemeClr val="bg2">
+                <a:lumMod val="75000"/>
+              </a:schemeClr>
+            </a:solidFill>
+            <a:prstDash val="sysDash"/>
+          </a:ln>
+        </p:spPr>
+        <p:style>
+          <a:lnRef idx="2">
+            <a:schemeClr val="accent1">
+              <a:shade val="15000"/>
+            </a:schemeClr>
+          </a:lnRef>
+          <a:fillRef idx="1">
+            <a:schemeClr val="accent1"/>
+          </a:fillRef>
+          <a:effectRef idx="0">
+            <a:schemeClr val="accent1"/>
+          </a:effectRef>
+          <a:fontRef idx="minor">
+            <a:schemeClr val="lt1"/>
+          </a:fontRef>
+        </p:style>
+        <p:txBody>
+          <a:bodyPr lIns="0" rIns="0" rtlCol="0" anchor="b" anchorCtr="0"/>
+          <a:lstStyle/>
+          <a:p>
+            <a:pPr algn="r"/>
+            <a:r>
+              <a:rPr lang="en-US" sz="1400" i="1" dirty="0">
+                <a:solidFill>
+                  <a:schemeClr val="bg2">
+                    <a:lumMod val="75000"/>
+                  </a:schemeClr>
+                </a:solidFill>
+              </a:rPr>
+              <a:t>gameover.py</a:t>
+            </a:r>
+          </a:p>
+        </p:txBody>
+      </p:sp>
+      <p:sp>
+        <p:nvSpPr>
+          <p:cNvPr id="61" name="Rectangle 60">
+            <a:extLst>
+              <a:ext uri="{FF2B5EF4-FFF2-40B4-BE49-F238E27FC236}">
+                <a16:creationId xmlns:a16="http://schemas.microsoft.com/office/drawing/2014/main" id="{31ABEBEC-6977-1511-99BB-7B9747108BD8}"/>
+              </a:ext>
+            </a:extLst>
+          </p:cNvPr>
+          <p:cNvSpPr/>
+          <p:nvPr/>
+        </p:nvSpPr>
+        <p:spPr>
+          <a:xfrm>
+            <a:off x="7389095" y="2555415"/>
+            <a:ext cx="1069772" cy="2020259"/>
+          </a:xfrm>
+          <a:prstGeom prst="rect">
+            <a:avLst/>
+          </a:prstGeom>
+          <a:noFill/>
+          <a:ln>
+            <a:solidFill>
+              <a:schemeClr val="bg2">
+                <a:lumMod val="75000"/>
+              </a:schemeClr>
+            </a:solidFill>
+            <a:prstDash val="sysDash"/>
+          </a:ln>
+        </p:spPr>
+        <p:style>
+          <a:lnRef idx="2">
+            <a:schemeClr val="accent1">
+              <a:shade val="15000"/>
+            </a:schemeClr>
+          </a:lnRef>
+          <a:fillRef idx="1">
+            <a:schemeClr val="accent1"/>
+          </a:fillRef>
+          <a:effectRef idx="0">
+            <a:schemeClr val="accent1"/>
+          </a:effectRef>
+          <a:fontRef idx="minor">
+            <a:schemeClr val="lt1"/>
+          </a:fontRef>
+        </p:style>
+        <p:txBody>
+          <a:bodyPr lIns="0" rIns="0" rtlCol="0" anchor="b" anchorCtr="0"/>
+          <a:lstStyle/>
+          <a:p>
+            <a:pPr algn="r"/>
+            <a:r>
+              <a:rPr lang="en-US" sz="1400" i="1" dirty="0">
+                <a:solidFill>
+                  <a:schemeClr val="bg2">
+                    <a:lumMod val="75000"/>
+                  </a:schemeClr>
+                </a:solidFill>
+              </a:rPr>
+              <a:t>menu.py</a:t>
+            </a:r>
+          </a:p>
+        </p:txBody>
+      </p:sp>
+      <p:sp>
+        <p:nvSpPr>
+          <p:cNvPr id="63" name="Rectangle 62">
+            <a:extLst>
+              <a:ext uri="{FF2B5EF4-FFF2-40B4-BE49-F238E27FC236}">
+                <a16:creationId xmlns:a16="http://schemas.microsoft.com/office/drawing/2014/main" id="{F77815C5-60B8-BAD4-904F-7790F104AB47}"/>
+              </a:ext>
+            </a:extLst>
+          </p:cNvPr>
+          <p:cNvSpPr/>
+          <p:nvPr/>
+        </p:nvSpPr>
+        <p:spPr>
+          <a:xfrm>
+            <a:off x="8537855" y="2555415"/>
+            <a:ext cx="1069772" cy="2020259"/>
+          </a:xfrm>
+          <a:prstGeom prst="rect">
+            <a:avLst/>
+          </a:prstGeom>
+          <a:noFill/>
+          <a:ln>
+            <a:solidFill>
+              <a:schemeClr val="bg2">
+                <a:lumMod val="75000"/>
+              </a:schemeClr>
+            </a:solidFill>
+            <a:prstDash val="sysDash"/>
+          </a:ln>
+        </p:spPr>
+        <p:style>
+          <a:lnRef idx="2">
+            <a:schemeClr val="accent1">
+              <a:shade val="15000"/>
+            </a:schemeClr>
+          </a:lnRef>
+          <a:fillRef idx="1">
+            <a:schemeClr val="accent1"/>
+          </a:fillRef>
+          <a:effectRef idx="0">
+            <a:schemeClr val="accent1"/>
+          </a:effectRef>
+          <a:fontRef idx="minor">
+            <a:schemeClr val="lt1"/>
+          </a:fontRef>
+        </p:style>
+        <p:txBody>
+          <a:bodyPr lIns="0" rIns="0" rtlCol="0" anchor="b" anchorCtr="0"/>
+          <a:lstStyle/>
+          <a:p>
+            <a:pPr algn="r"/>
+            <a:r>
+              <a:rPr lang="en-US" sz="1400" i="1" dirty="0">
+                <a:solidFill>
+                  <a:schemeClr val="bg2">
+                    <a:lumMod val="75000"/>
+                  </a:schemeClr>
+                </a:solidFill>
+              </a:rPr>
+              <a:t>splash.py</a:t>
+            </a:r>
+          </a:p>
+        </p:txBody>
+      </p:sp>
     </p:spTree>
     <p:extLst>
       <p:ext uri="{BB962C8B-B14F-4D97-AF65-F5344CB8AC3E}">
@@ -6993,246 +7925,6 @@
       </p:grpSpPr>
       <p:grpSp>
         <p:nvGrpSpPr>
-          <p:cNvPr id="69" name="Group 68">
-            <a:extLst>
-              <a:ext uri="{FF2B5EF4-FFF2-40B4-BE49-F238E27FC236}">
-                <a16:creationId xmlns:a16="http://schemas.microsoft.com/office/drawing/2014/main" id="{920CA521-8FD8-6F49-9D64-95945A7C5F2A}"/>
-              </a:ext>
-            </a:extLst>
-          </p:cNvPr>
-          <p:cNvGrpSpPr/>
-          <p:nvPr/>
-        </p:nvGrpSpPr>
-        <p:grpSpPr>
-          <a:xfrm>
-            <a:off x="1866742" y="1875336"/>
-            <a:ext cx="918201" cy="1553664"/>
-            <a:chOff x="15766181" y="15850401"/>
-            <a:chExt cx="6097606" cy="11083489"/>
-          </a:xfrm>
-        </p:grpSpPr>
-        <p:sp>
-          <p:nvSpPr>
-            <p:cNvPr id="70" name="Rectangle 69">
-              <a:extLst>
-                <a:ext uri="{FF2B5EF4-FFF2-40B4-BE49-F238E27FC236}">
-                  <a16:creationId xmlns:a16="http://schemas.microsoft.com/office/drawing/2014/main" id="{3C971E82-5566-9DE5-9B5A-E555606C0FCE}"/>
-                </a:ext>
-              </a:extLst>
-            </p:cNvPr>
-            <p:cNvSpPr/>
-            <p:nvPr/>
-          </p:nvSpPr>
-          <p:spPr>
-            <a:xfrm>
-              <a:off x="15766181" y="15850401"/>
-              <a:ext cx="6097606" cy="1583358"/>
-            </a:xfrm>
-            <a:prstGeom prst="rect">
-              <a:avLst/>
-            </a:prstGeom>
-            <a:solidFill>
-              <a:schemeClr val="accent1"/>
-            </a:solidFill>
-          </p:spPr>
-          <p:style>
-            <a:lnRef idx="2">
-              <a:schemeClr val="accent3">
-                <a:shade val="15000"/>
-              </a:schemeClr>
-            </a:lnRef>
-            <a:fillRef idx="1">
-              <a:schemeClr val="accent3"/>
-            </a:fillRef>
-            <a:effectRef idx="0">
-              <a:schemeClr val="accent3"/>
-            </a:effectRef>
-            <a:fontRef idx="minor">
-              <a:schemeClr val="lt1"/>
-            </a:fontRef>
-          </p:style>
-          <p:txBody>
-            <a:bodyPr rtlCol="0" anchor="ctr">
-              <a:noAutofit/>
-            </a:bodyPr>
-            <a:lstStyle/>
-            <a:p>
-              <a:pPr algn="ctr"/>
-              <a:r>
-                <a:rPr lang="en-US" sz="600" b="1" noProof="1"/>
-                <a:t>GamePlay</a:t>
-              </a:r>
-            </a:p>
-          </p:txBody>
-        </p:sp>
-        <p:sp>
-          <p:nvSpPr>
-            <p:cNvPr id="71" name="Rectangle 70">
-              <a:extLst>
-                <a:ext uri="{FF2B5EF4-FFF2-40B4-BE49-F238E27FC236}">
-                  <a16:creationId xmlns:a16="http://schemas.microsoft.com/office/drawing/2014/main" id="{92B92192-679A-D251-3D79-5ECFF5E5C282}"/>
-                </a:ext>
-              </a:extLst>
-            </p:cNvPr>
-            <p:cNvSpPr/>
-            <p:nvPr/>
-          </p:nvSpPr>
-          <p:spPr>
-            <a:xfrm>
-              <a:off x="15766181" y="17433759"/>
-              <a:ext cx="6097606" cy="4750066"/>
-            </a:xfrm>
-            <a:prstGeom prst="rect">
-              <a:avLst/>
-            </a:prstGeom>
-            <a:noFill/>
-          </p:spPr>
-          <p:style>
-            <a:lnRef idx="2">
-              <a:schemeClr val="accent3">
-                <a:shade val="15000"/>
-              </a:schemeClr>
-            </a:lnRef>
-            <a:fillRef idx="1">
-              <a:schemeClr val="accent3"/>
-            </a:fillRef>
-            <a:effectRef idx="0">
-              <a:schemeClr val="accent3"/>
-            </a:effectRef>
-            <a:fontRef idx="minor">
-              <a:schemeClr val="lt1"/>
-            </a:fontRef>
-          </p:style>
-          <p:txBody>
-            <a:bodyPr lIns="0" rIns="0" rtlCol="0" anchor="t" anchorCtr="0">
-              <a:noAutofit/>
-            </a:bodyPr>
-            <a:lstStyle/>
-            <a:p>
-              <a:pPr marL="114300" indent="-57150">
-                <a:buFont typeface="Arial" panose="020B0604020202020204" pitchFamily="34" charset="0"/>
-                <a:buChar char="•"/>
-              </a:pPr>
-              <a:endParaRPr lang="en-US" sz="500" b="1" noProof="1">
-                <a:solidFill>
-                  <a:schemeClr val="tx1"/>
-                </a:solidFill>
-              </a:endParaRPr>
-            </a:p>
-            <a:p>
-              <a:pPr marL="114300" indent="-57150">
-                <a:buFont typeface="Arial" panose="020B0604020202020204" pitchFamily="34" charset="0"/>
-                <a:buChar char="•"/>
-              </a:pPr>
-              <a:r>
-                <a:rPr lang="en-US" sz="500" noProof="1">
-                  <a:solidFill>
-                    <a:schemeClr val="tx1"/>
-                  </a:solidFill>
-                </a:rPr>
-                <a:t>next: str = “GAME_OVER”</a:t>
-              </a:r>
-            </a:p>
-            <a:p>
-              <a:pPr marL="530152" indent="-355102">
-                <a:buFont typeface="Arial" panose="020B0604020202020204" pitchFamily="34" charset="0"/>
-                <a:buChar char="•"/>
-              </a:pPr>
-              <a:endParaRPr lang="en-US" sz="500" noProof="1">
-                <a:solidFill>
-                  <a:schemeClr val="tx1"/>
-                </a:solidFill>
-              </a:endParaRPr>
-            </a:p>
-            <a:p>
-              <a:pPr marL="530152" indent="-355102">
-                <a:buFont typeface="Arial" panose="020B0604020202020204" pitchFamily="34" charset="0"/>
-                <a:buChar char="•"/>
-              </a:pPr>
-              <a:endParaRPr lang="en-US" sz="500" noProof="1">
-                <a:solidFill>
-                  <a:schemeClr val="tx1"/>
-                </a:solidFill>
-              </a:endParaRPr>
-            </a:p>
-          </p:txBody>
-        </p:sp>
-        <p:sp>
-          <p:nvSpPr>
-            <p:cNvPr id="72" name="Rectangle 71">
-              <a:extLst>
-                <a:ext uri="{FF2B5EF4-FFF2-40B4-BE49-F238E27FC236}">
-                  <a16:creationId xmlns:a16="http://schemas.microsoft.com/office/drawing/2014/main" id="{73BD4F32-B7F1-D57F-6CEA-C1D72A8475E3}"/>
-                </a:ext>
-              </a:extLst>
-            </p:cNvPr>
-            <p:cNvSpPr/>
-            <p:nvPr/>
-          </p:nvSpPr>
-          <p:spPr>
-            <a:xfrm>
-              <a:off x="15766181" y="22183824"/>
-              <a:ext cx="6097606" cy="4750066"/>
-            </a:xfrm>
-            <a:prstGeom prst="rect">
-              <a:avLst/>
-            </a:prstGeom>
-            <a:noFill/>
-          </p:spPr>
-          <p:style>
-            <a:lnRef idx="2">
-              <a:schemeClr val="accent3">
-                <a:shade val="15000"/>
-              </a:schemeClr>
-            </a:lnRef>
-            <a:fillRef idx="1">
-              <a:schemeClr val="accent3"/>
-            </a:fillRef>
-            <a:effectRef idx="0">
-              <a:schemeClr val="accent3"/>
-            </a:effectRef>
-            <a:fontRef idx="minor">
-              <a:schemeClr val="lt1"/>
-            </a:fontRef>
-          </p:style>
-          <p:txBody>
-            <a:bodyPr lIns="0" rIns="0" rtlCol="0" anchor="t" anchorCtr="0">
-              <a:noAutofit/>
-            </a:bodyPr>
-            <a:lstStyle/>
-            <a:p>
-              <a:pPr marL="114300" indent="-57150">
-                <a:buFont typeface="Arial" panose="020B0604020202020204" pitchFamily="34" charset="0"/>
-                <a:buChar char="•"/>
-              </a:pPr>
-              <a:r>
-                <a:rPr lang="en-US" sz="600" noProof="1">
-                  <a:solidFill>
-                    <a:schemeClr val="tx1"/>
-                  </a:solidFill>
-                </a:rPr>
-                <a:t>startup()</a:t>
-              </a:r>
-            </a:p>
-            <a:p>
-              <a:pPr marL="114300" indent="-57150">
-                <a:buFont typeface="Arial" panose="020B0604020202020204" pitchFamily="34" charset="0"/>
-                <a:buChar char="•"/>
-              </a:pPr>
-              <a:r>
-                <a:rPr lang="en-US" sz="600" noProof="1">
-                  <a:solidFill>
-                    <a:schemeClr val="tx1"/>
-                  </a:solidFill>
-                </a:rPr>
-                <a:t>get_event()</a:t>
-              </a:r>
-            </a:p>
-          </p:txBody>
-        </p:sp>
-      </p:grpSp>
-      <p:grpSp>
-        <p:nvGrpSpPr>
           <p:cNvPr id="73" name="Group 72">
             <a:extLst>
               <a:ext uri="{FF2B5EF4-FFF2-40B4-BE49-F238E27FC236}">
@@ -7245,10 +7937,10 @@
         </p:nvGrpSpPr>
         <p:grpSpPr>
           <a:xfrm>
-            <a:off x="3862077" y="767264"/>
-            <a:ext cx="918201" cy="1553664"/>
+            <a:off x="3126743" y="2516445"/>
+            <a:ext cx="918201" cy="1852556"/>
             <a:chOff x="7893197" y="28597250"/>
-            <a:chExt cx="6097606" cy="11083489"/>
+            <a:chExt cx="6097606" cy="13215717"/>
           </a:xfrm>
         </p:grpSpPr>
         <p:sp>
@@ -7303,6 +7995,14 @@
                 <a:t>Player</a:t>
               </a:r>
             </a:p>
+            <a:p>
+              <a:pPr algn="ctr"/>
+              <a:r>
+                <a:rPr lang="en-US" sz="500" i="1" noProof="1"/>
+                <a:t>from ship from GameObject</a:t>
+              </a:r>
+              <a:endParaRPr lang="en-US" sz="600" i="1" noProof="1"/>
+            </a:p>
           </p:txBody>
         </p:sp>
         <p:sp>
@@ -7353,6 +8053,56 @@
                 <a:buFont typeface="Arial" panose="020B0604020202020204" pitchFamily="34" charset="0"/>
                 <a:buChar char="•"/>
               </a:pPr>
+              <a:r>
+                <a:rPr lang="en-US" sz="600" noProof="1">
+                  <a:solidFill>
+                    <a:schemeClr val="tx1"/>
+                  </a:solidFill>
+                </a:rPr>
+                <a:t>State = </a:t>
+              </a:r>
+              <a:r>
+                <a:rPr lang="en-US" sz="600" b="1" noProof="1">
+                  <a:solidFill>
+                    <a:schemeClr val="tx1"/>
+                  </a:solidFill>
+                </a:rPr>
+                <a:t>GameObjState()</a:t>
+              </a:r>
+            </a:p>
+            <a:p>
+              <a:pPr marL="114300" indent="-57150">
+                <a:buFont typeface="Arial" panose="020B0604020202020204" pitchFamily="34" charset="0"/>
+                <a:buChar char="•"/>
+              </a:pPr>
+              <a:r>
+                <a:rPr lang="en-US" sz="600" noProof="1">
+                  <a:solidFill>
+                    <a:schemeClr val="tx1"/>
+                  </a:solidFill>
+                </a:rPr>
+                <a:t>max_velocity = 100</a:t>
+              </a:r>
+            </a:p>
+            <a:p>
+              <a:pPr marL="114300" indent="-57150">
+                <a:buFont typeface="Arial" panose="020B0604020202020204" pitchFamily="34" charset="0"/>
+                <a:buChar char="•"/>
+              </a:pPr>
+              <a:r>
+                <a:rPr lang="en-US" sz="600" noProof="1">
+                  <a:solidFill>
+                    <a:schemeClr val="tx1"/>
+                  </a:solidFill>
+                </a:rPr>
+                <a:t>min_velocity = -10</a:t>
+              </a:r>
+            </a:p>
+            <a:p>
+              <a:pPr marL="114300" indent="-57150">
+                <a:buFont typeface="Arial" panose="020B0604020202020204" pitchFamily="34" charset="0"/>
+                <a:buChar char="•"/>
+              </a:pPr>
               <a:endParaRPr lang="en-US" sz="600" noProof="1">
                 <a:solidFill>
                   <a:schemeClr val="tx1"/>
@@ -7386,8 +8136,8 @@
           </p:nvSpPr>
           <p:spPr>
             <a:xfrm>
-              <a:off x="7893197" y="34930673"/>
-              <a:ext cx="6097606" cy="4750066"/>
+              <a:off x="7893197" y="34930672"/>
+              <a:ext cx="6097606" cy="6882295"/>
             </a:xfrm>
             <a:prstGeom prst="rect">
               <a:avLst/>
@@ -7415,6 +8165,123 @@
               <a:noAutofit/>
             </a:bodyPr>
             <a:lstStyle/>
+            <a:p>
+              <a:pPr marL="114300" indent="-57150">
+                <a:buFont typeface="Arial" panose="020B0604020202020204" pitchFamily="34" charset="0"/>
+                <a:buChar char="•"/>
+              </a:pPr>
+              <a:r>
+                <a:rPr lang="en-US" sz="600" noProof="1">
+                  <a:solidFill>
+                    <a:schemeClr val="tx1"/>
+                  </a:solidFill>
+                </a:rPr>
+                <a:t>accellerate()</a:t>
+              </a:r>
+            </a:p>
+            <a:p>
+              <a:pPr marL="114300" indent="-57150">
+                <a:buFont typeface="Arial" panose="020B0604020202020204" pitchFamily="34" charset="0"/>
+                <a:buChar char="•"/>
+              </a:pPr>
+              <a:r>
+                <a:rPr lang="en-US" sz="600" noProof="1">
+                  <a:solidFill>
+                    <a:schemeClr val="tx1"/>
+                  </a:solidFill>
+                </a:rPr>
+                <a:t>spin()</a:t>
+              </a:r>
+            </a:p>
+            <a:p>
+              <a:pPr marL="114300" indent="-57150">
+                <a:buFont typeface="Arial" panose="020B0604020202020204" pitchFamily="34" charset="0"/>
+                <a:buChar char="•"/>
+              </a:pPr>
+              <a:r>
+                <a:rPr lang="en-US" sz="600" noProof="1">
+                  <a:solidFill>
+                    <a:schemeClr val="tx1"/>
+                  </a:solidFill>
+                </a:rPr>
+                <a:t>fire()</a:t>
+              </a:r>
+            </a:p>
+            <a:p>
+              <a:pPr marL="114300" indent="-57150">
+                <a:buFont typeface="Arial" panose="020B0604020202020204" pitchFamily="34" charset="0"/>
+                <a:buChar char="•"/>
+              </a:pPr>
+              <a:r>
+                <a:rPr lang="en-US" sz="600" noProof="1">
+                  <a:solidFill>
+                    <a:schemeClr val="tx1"/>
+                  </a:solidFill>
+                </a:rPr>
+                <a:t>trigger_shield()</a:t>
+              </a:r>
+            </a:p>
+            <a:p>
+              <a:pPr marL="114300" indent="-57150">
+                <a:buFont typeface="Arial" panose="020B0604020202020204" pitchFamily="34" charset="0"/>
+                <a:buChar char="•"/>
+              </a:pPr>
+              <a:r>
+                <a:rPr lang="en-US" sz="600" noProof="1">
+                  <a:solidFill>
+                    <a:schemeClr val="accent6">
+                      <a:lumMod val="50000"/>
+                    </a:schemeClr>
+                  </a:solidFill>
+                </a:rPr>
+                <a:t>get_event()</a:t>
+              </a:r>
+            </a:p>
+            <a:p>
+              <a:pPr marL="114300" indent="-57150">
+                <a:buFont typeface="Arial" panose="020B0604020202020204" pitchFamily="34" charset="0"/>
+                <a:buChar char="•"/>
+              </a:pPr>
+              <a:r>
+                <a:rPr lang="en-US" sz="600" noProof="1">
+                  <a:solidFill>
+                    <a:schemeClr val="accent6">
+                      <a:lumMod val="50000"/>
+                    </a:schemeClr>
+                  </a:solidFill>
+                </a:rPr>
+                <a:t>update()</a:t>
+              </a:r>
+            </a:p>
+            <a:p>
+              <a:pPr marL="114300" indent="-57150">
+                <a:buFont typeface="Arial" panose="020B0604020202020204" pitchFamily="34" charset="0"/>
+                <a:buChar char="•"/>
+              </a:pPr>
+              <a:r>
+                <a:rPr lang="en-US" sz="600" noProof="1">
+                  <a:solidFill>
+                    <a:schemeClr val="accent6">
+                      <a:lumMod val="50000"/>
+                    </a:schemeClr>
+                  </a:solidFill>
+                </a:rPr>
+                <a:t>draw()</a:t>
+              </a:r>
+            </a:p>
+            <a:p>
+              <a:pPr marL="114300" indent="-57150">
+                <a:buFont typeface="Arial" panose="020B0604020202020204" pitchFamily="34" charset="0"/>
+                <a:buChar char="•"/>
+              </a:pPr>
+              <a:endParaRPr lang="en-US" sz="600" noProof="1">
+                <a:solidFill>
+                  <a:schemeClr val="accent6">
+                    <a:lumMod val="50000"/>
+                  </a:schemeClr>
+                </a:solidFill>
+              </a:endParaRPr>
+            </a:p>
             <a:p>
               <a:pPr marL="114300" indent="-57150">
                 <a:buFont typeface="Arial" panose="020B0604020202020204" pitchFamily="34" charset="0"/>
@@ -7465,7 +8332,7 @@
         </p:nvGrpSpPr>
         <p:grpSpPr>
           <a:xfrm>
-            <a:off x="4207523" y="1098504"/>
+            <a:off x="5876303" y="3037289"/>
             <a:ext cx="918201" cy="1553664"/>
             <a:chOff x="7893197" y="28597250"/>
             <a:chExt cx="6097606" cy="11083489"/>
@@ -7686,7 +8553,7 @@
         </p:nvGrpSpPr>
         <p:grpSpPr>
           <a:xfrm>
-            <a:off x="4493899" y="1542408"/>
+            <a:off x="6162679" y="3481193"/>
             <a:ext cx="918201" cy="1553664"/>
             <a:chOff x="7893197" y="28597250"/>
             <a:chExt cx="6097606" cy="11083489"/>
@@ -7910,7 +8777,7 @@
         </p:nvGrpSpPr>
         <p:grpSpPr>
           <a:xfrm>
-            <a:off x="3862077" y="3649264"/>
+            <a:off x="1843064" y="2512888"/>
             <a:ext cx="918201" cy="1553664"/>
             <a:chOff x="7893197" y="28597250"/>
             <a:chExt cx="6097606" cy="11083489"/>
@@ -8020,10 +8887,80 @@
               <a:r>
                 <a:rPr lang="en-US" sz="600" noProof="1">
                   <a:solidFill>
-                    <a:schemeClr val="tx1"/>
-                  </a:solidFill>
-                </a:rPr>
-                <a:t>something</a:t>
+                    <a:schemeClr val="accent6">
+                      <a:lumMod val="50000"/>
+                    </a:schemeClr>
+                  </a:solidFill>
+                </a:rPr>
+                <a:t>Number: int</a:t>
+              </a:r>
+            </a:p>
+            <a:p>
+              <a:pPr marL="114300" indent="-57150">
+                <a:buFont typeface="Arial" panose="020B0604020202020204" pitchFamily="34" charset="0"/>
+                <a:buChar char="•"/>
+              </a:pPr>
+              <a:r>
+                <a:rPr lang="en-US" sz="600" noProof="1">
+                  <a:solidFill>
+                    <a:schemeClr val="accent6">
+                      <a:lumMod val="50000"/>
+                    </a:schemeClr>
+                  </a:solidFill>
+                </a:rPr>
+                <a:t>enemyAI_difficulty: int</a:t>
+              </a:r>
+            </a:p>
+            <a:p>
+              <a:pPr marL="114300" indent="-57150">
+                <a:buFont typeface="Arial" panose="020B0604020202020204" pitchFamily="34" charset="0"/>
+                <a:buChar char="•"/>
+              </a:pPr>
+              <a:r>
+                <a:rPr lang="en-US" sz="600" b="1" noProof="1">
+                  <a:solidFill>
+                    <a:schemeClr val="accent6">
+                      <a:lumMod val="50000"/>
+                    </a:schemeClr>
+                  </a:solidFill>
+                </a:rPr>
+                <a:t>player</a:t>
+              </a:r>
+              <a:r>
+                <a:rPr lang="en-US" sz="600" noProof="1">
+                  <a:solidFill>
+                    <a:schemeClr val="accent6">
+                      <a:lumMod val="50000"/>
+                    </a:schemeClr>
+                  </a:solidFill>
+                </a:rPr>
+                <a:t> = Player(…)</a:t>
+              </a:r>
+            </a:p>
+            <a:p>
+              <a:pPr marL="114300" indent="-57150">
+                <a:buFont typeface="Arial" panose="020B0604020202020204" pitchFamily="34" charset="0"/>
+                <a:buChar char="•"/>
+              </a:pPr>
+              <a:r>
+                <a:rPr lang="en-US" sz="600" b="1" noProof="1">
+                  <a:solidFill>
+                    <a:schemeClr val="accent6">
+                      <a:lumMod val="50000"/>
+                    </a:schemeClr>
+                  </a:solidFill>
+                </a:rPr>
+                <a:t>enemy</a:t>
+              </a:r>
+              <a:r>
+                <a:rPr lang="en-US" sz="600" noProof="1">
+                  <a:solidFill>
+                    <a:schemeClr val="accent6">
+                      <a:lumMod val="50000"/>
+                    </a:schemeClr>
+                  </a:solidFill>
+                </a:rPr>
+                <a:t> = EnemyAI(…)</a:t>
               </a:r>
             </a:p>
             <a:p>
@@ -8089,9 +9026,53 @@
                 <a:buFont typeface="Arial" panose="020B0604020202020204" pitchFamily="34" charset="0"/>
                 <a:buChar char="•"/>
               </a:pPr>
-              <a:endParaRPr lang="en-US" sz="600" noProof="1">
-                <a:solidFill>
-                  <a:schemeClr val="tx1"/>
+              <a:r>
+                <a:rPr lang="en-US" sz="600" noProof="1">
+                  <a:solidFill>
+                    <a:schemeClr val="accent6">
+                      <a:lumMod val="50000"/>
+                    </a:schemeClr>
+                  </a:solidFill>
+                </a:rPr>
+                <a:t>startup()</a:t>
+              </a:r>
+            </a:p>
+            <a:p>
+              <a:pPr marL="114300" indent="-57150">
+                <a:buFont typeface="Arial" panose="020B0604020202020204" pitchFamily="34" charset="0"/>
+                <a:buChar char="•"/>
+              </a:pPr>
+              <a:r>
+                <a:rPr lang="en-US" sz="600" noProof="1">
+                  <a:solidFill>
+                    <a:schemeClr val="accent6">
+                      <a:lumMod val="50000"/>
+                    </a:schemeClr>
+                  </a:solidFill>
+                </a:rPr>
+                <a:t>get_event() calls </a:t>
+              </a:r>
+              <a:r>
+                <a:rPr lang="en-US" sz="600" b="1" noProof="1">
+                  <a:solidFill>
+                    <a:schemeClr val="accent6">
+                      <a:lumMod val="50000"/>
+                    </a:schemeClr>
+                  </a:solidFill>
+                </a:rPr>
+                <a:t>player</a:t>
+              </a:r>
+            </a:p>
+            <a:p>
+              <a:pPr marL="114300" indent="-57150">
+                <a:buFont typeface="Arial" panose="020B0604020202020204" pitchFamily="34" charset="0"/>
+                <a:buChar char="•"/>
+              </a:pPr>
+              <a:endParaRPr lang="en-US" sz="600" b="1" noProof="1">
+                <a:solidFill>
+                  <a:schemeClr val="accent6">
+                    <a:lumMod val="50000"/>
+                  </a:schemeClr>
                 </a:solidFill>
               </a:endParaRPr>
             </a:p>
@@ -8100,22 +9081,52 @@
                 <a:buFont typeface="Arial" panose="020B0604020202020204" pitchFamily="34" charset="0"/>
                 <a:buChar char="•"/>
               </a:pPr>
-              <a:endParaRPr lang="en-US" sz="600" noProof="1">
-                <a:solidFill>
-                  <a:schemeClr val="tx1"/>
-                </a:solidFill>
-              </a:endParaRPr>
-            </a:p>
-            <a:p>
-              <a:pPr marL="114300" indent="-57150">
-                <a:buFont typeface="Arial" panose="020B0604020202020204" pitchFamily="34" charset="0"/>
-                <a:buChar char="•"/>
-              </a:pPr>
-              <a:endParaRPr lang="en-US" sz="600" noProof="1">
-                <a:solidFill>
-                  <a:schemeClr val="tx1"/>
-                </a:solidFill>
-              </a:endParaRPr>
+              <a:r>
+                <a:rPr lang="en-US" sz="600" noProof="1">
+                  <a:solidFill>
+                    <a:schemeClr val="accent6">
+                      <a:lumMod val="50000"/>
+                    </a:schemeClr>
+                  </a:solidFill>
+                </a:rPr>
+                <a:t>update() calls </a:t>
+              </a:r>
+              <a:r>
+                <a:rPr lang="en-US" sz="600" b="1" noProof="1">
+                  <a:solidFill>
+                    <a:schemeClr val="accent6">
+                      <a:lumMod val="50000"/>
+                    </a:schemeClr>
+                  </a:solidFill>
+                </a:rPr>
+                <a:t>player</a:t>
+              </a:r>
+            </a:p>
+            <a:p>
+              <a:pPr marL="114300" indent="-57150">
+                <a:buFont typeface="Arial" panose="020B0604020202020204" pitchFamily="34" charset="0"/>
+                <a:buChar char="•"/>
+              </a:pPr>
+              <a:r>
+                <a:rPr lang="en-US" sz="600" noProof="1">
+                  <a:solidFill>
+                    <a:schemeClr val="accent6">
+                      <a:lumMod val="50000"/>
+                    </a:schemeClr>
+                  </a:solidFill>
+                </a:rPr>
+                <a:t>draw call </a:t>
+              </a:r>
+              <a:r>
+                <a:rPr lang="en-US" sz="600" b="1" noProof="1">
+                  <a:solidFill>
+                    <a:schemeClr val="accent6">
+                      <a:lumMod val="50000"/>
+                    </a:schemeClr>
+                  </a:solidFill>
+                </a:rPr>
+                <a:t>player</a:t>
+              </a:r>
             </a:p>
           </p:txBody>
         </p:sp>
@@ -8131,13 +9142,12 @@
           </p:cNvPr>
           <p:cNvCxnSpPr>
             <a:cxnSpLocks/>
-            <a:stCxn id="82" idx="1"/>
           </p:cNvCxnSpPr>
           <p:nvPr/>
         </p:nvCxnSpPr>
         <p:spPr>
           <a:xfrm rot="10800000" flipV="1">
-            <a:off x="2076451" y="1322144"/>
+            <a:off x="5295253" y="1549165"/>
             <a:ext cx="1785627" cy="995408"/>
           </a:xfrm>
           <a:prstGeom prst="bentConnector3">
@@ -8176,7 +9186,7 @@
         </p:nvCxnSpPr>
         <p:spPr>
           <a:xfrm rot="10800000" flipV="1">
-            <a:off x="2076449" y="1653384"/>
+            <a:off x="3745229" y="3592169"/>
             <a:ext cx="2131074" cy="701476"/>
           </a:xfrm>
           <a:prstGeom prst="bentConnector3">
@@ -8215,7 +9225,7 @@
         </p:nvCxnSpPr>
         <p:spPr>
           <a:xfrm rot="10800000" flipV="1">
-            <a:off x="2076449" y="2097287"/>
+            <a:off x="3745229" y="4036072"/>
             <a:ext cx="2417451" cy="310527"/>
           </a:xfrm>
           <a:prstGeom prst="bentConnector3">
@@ -8248,13 +9258,12 @@
           </p:cNvPr>
           <p:cNvCxnSpPr>
             <a:cxnSpLocks/>
-            <a:stCxn id="94" idx="1"/>
           </p:cNvCxnSpPr>
           <p:nvPr/>
         </p:nvCxnSpPr>
         <p:spPr>
           <a:xfrm rot="10800000">
-            <a:off x="2111519" y="2465836"/>
+            <a:off x="4310132" y="1511881"/>
             <a:ext cx="1750558" cy="1738309"/>
           </a:xfrm>
           <a:prstGeom prst="bentConnector3">
@@ -8262,6 +9271,726 @@
               <a:gd name="adj1" fmla="val 50000"/>
             </a:avLst>
           </a:prstGeom>
+        </p:spPr>
+        <p:style>
+          <a:lnRef idx="1">
+            <a:schemeClr val="accent1"/>
+          </a:lnRef>
+          <a:fillRef idx="0">
+            <a:schemeClr val="accent1"/>
+          </a:fillRef>
+          <a:effectRef idx="0">
+            <a:schemeClr val="accent1"/>
+          </a:effectRef>
+          <a:fontRef idx="minor">
+            <a:schemeClr val="tx1"/>
+          </a:fontRef>
+        </p:style>
+      </p:cxnSp>
+      <p:grpSp>
+        <p:nvGrpSpPr>
+          <p:cNvPr id="2" name="Group 1">
+            <a:extLst>
+              <a:ext uri="{FF2B5EF4-FFF2-40B4-BE49-F238E27FC236}">
+                <a16:creationId xmlns:a16="http://schemas.microsoft.com/office/drawing/2014/main" id="{3E1833F1-3C1E-2DD9-B320-BDE552079F21}"/>
+              </a:ext>
+            </a:extLst>
+          </p:cNvPr>
+          <p:cNvGrpSpPr/>
+          <p:nvPr/>
+        </p:nvGrpSpPr>
+        <p:grpSpPr>
+          <a:xfrm>
+            <a:off x="638487" y="2512888"/>
+            <a:ext cx="918201" cy="1553664"/>
+            <a:chOff x="15766181" y="15850401"/>
+            <a:chExt cx="6097606" cy="11083489"/>
+          </a:xfrm>
+        </p:grpSpPr>
+        <p:sp>
+          <p:nvSpPr>
+            <p:cNvPr id="3" name="Rectangle 2">
+              <a:extLst>
+                <a:ext uri="{FF2B5EF4-FFF2-40B4-BE49-F238E27FC236}">
+                  <a16:creationId xmlns:a16="http://schemas.microsoft.com/office/drawing/2014/main" id="{24306418-08DB-A021-A2B1-E3820D33A017}"/>
+                </a:ext>
+              </a:extLst>
+            </p:cNvPr>
+            <p:cNvSpPr/>
+            <p:nvPr/>
+          </p:nvSpPr>
+          <p:spPr>
+            <a:xfrm>
+              <a:off x="15766181" y="15850401"/>
+              <a:ext cx="6097606" cy="1583358"/>
+            </a:xfrm>
+            <a:prstGeom prst="rect">
+              <a:avLst/>
+            </a:prstGeom>
+            <a:solidFill>
+              <a:schemeClr val="accent1"/>
+            </a:solidFill>
+          </p:spPr>
+          <p:style>
+            <a:lnRef idx="2">
+              <a:schemeClr val="accent3">
+                <a:shade val="15000"/>
+              </a:schemeClr>
+            </a:lnRef>
+            <a:fillRef idx="1">
+              <a:schemeClr val="accent3"/>
+            </a:fillRef>
+            <a:effectRef idx="0">
+              <a:schemeClr val="accent3"/>
+            </a:effectRef>
+            <a:fontRef idx="minor">
+              <a:schemeClr val="lt1"/>
+            </a:fontRef>
+          </p:style>
+          <p:txBody>
+            <a:bodyPr rtlCol="0" anchor="ctr">
+              <a:noAutofit/>
+            </a:bodyPr>
+            <a:lstStyle/>
+            <a:p>
+              <a:pPr algn="ctr"/>
+              <a:r>
+                <a:rPr lang="en-US" sz="600" b="1" noProof="1"/>
+                <a:t>GamePlay</a:t>
+              </a:r>
+            </a:p>
+            <a:p>
+              <a:pPr algn="ctr"/>
+              <a:r>
+                <a:rPr lang="en-US" sz="500" i="1" noProof="1"/>
+                <a:t>from BaseState</a:t>
+              </a:r>
+            </a:p>
+          </p:txBody>
+        </p:sp>
+        <p:sp>
+          <p:nvSpPr>
+            <p:cNvPr id="4" name="Rectangle 3">
+              <a:extLst>
+                <a:ext uri="{FF2B5EF4-FFF2-40B4-BE49-F238E27FC236}">
+                  <a16:creationId xmlns:a16="http://schemas.microsoft.com/office/drawing/2014/main" id="{EF744320-F716-A063-709B-1B5220794A2B}"/>
+                </a:ext>
+              </a:extLst>
+            </p:cNvPr>
+            <p:cNvSpPr/>
+            <p:nvPr/>
+          </p:nvSpPr>
+          <p:spPr>
+            <a:xfrm>
+              <a:off x="15766181" y="17433759"/>
+              <a:ext cx="6097606" cy="4750066"/>
+            </a:xfrm>
+            <a:prstGeom prst="rect">
+              <a:avLst/>
+            </a:prstGeom>
+            <a:noFill/>
+          </p:spPr>
+          <p:style>
+            <a:lnRef idx="2">
+              <a:schemeClr val="accent3">
+                <a:shade val="15000"/>
+              </a:schemeClr>
+            </a:lnRef>
+            <a:fillRef idx="1">
+              <a:schemeClr val="accent3"/>
+            </a:fillRef>
+            <a:effectRef idx="0">
+              <a:schemeClr val="accent3"/>
+            </a:effectRef>
+            <a:fontRef idx="minor">
+              <a:schemeClr val="lt1"/>
+            </a:fontRef>
+          </p:style>
+          <p:txBody>
+            <a:bodyPr lIns="0" rIns="0" rtlCol="0" anchor="t" anchorCtr="0">
+              <a:noAutofit/>
+            </a:bodyPr>
+            <a:lstStyle/>
+            <a:p>
+              <a:pPr marL="114300" indent="-57150">
+                <a:buFont typeface="Arial" panose="020B0604020202020204" pitchFamily="34" charset="0"/>
+                <a:buChar char="•"/>
+              </a:pPr>
+              <a:r>
+                <a:rPr lang="en-US" sz="500" noProof="1">
+                  <a:solidFill>
+                    <a:schemeClr val="tx1"/>
+                  </a:solidFill>
+                </a:rPr>
+                <a:t>done = False</a:t>
+              </a:r>
+            </a:p>
+            <a:p>
+              <a:pPr marL="114300" indent="-57150">
+                <a:buFont typeface="Arial" panose="020B0604020202020204" pitchFamily="34" charset="0"/>
+                <a:buChar char="•"/>
+              </a:pPr>
+              <a:r>
+                <a:rPr lang="en-US" sz="500" noProof="1">
+                  <a:solidFill>
+                    <a:schemeClr val="tx1"/>
+                  </a:solidFill>
+                </a:rPr>
+                <a:t>quit = False</a:t>
+              </a:r>
+            </a:p>
+            <a:p>
+              <a:pPr marL="114300" indent="-57150">
+                <a:buFont typeface="Arial" panose="020B0604020202020204" pitchFamily="34" charset="0"/>
+                <a:buChar char="•"/>
+              </a:pPr>
+              <a:r>
+                <a:rPr lang="en-US" sz="500" noProof="1">
+                  <a:solidFill>
+                    <a:schemeClr val="tx1"/>
+                  </a:solidFill>
+                </a:rPr>
+                <a:t>next_state: str = None</a:t>
+              </a:r>
+            </a:p>
+            <a:p>
+              <a:pPr marL="114300" indent="-57150">
+                <a:buFont typeface="Arial" panose="020B0604020202020204" pitchFamily="34" charset="0"/>
+                <a:buChar char="•"/>
+              </a:pPr>
+              <a:r>
+                <a:rPr lang="en-US" sz="500" noProof="1">
+                  <a:solidFill>
+                    <a:schemeClr val="tx1"/>
+                  </a:solidFill>
+                </a:rPr>
+                <a:t>screen_rect = pg.disp…</a:t>
+              </a:r>
+            </a:p>
+            <a:p>
+              <a:pPr marL="114300" indent="-57150">
+                <a:buFont typeface="Arial" panose="020B0604020202020204" pitchFamily="34" charset="0"/>
+                <a:buChar char="•"/>
+              </a:pPr>
+              <a:r>
+                <a:rPr lang="en-US" sz="500" noProof="1">
+                  <a:solidFill>
+                    <a:schemeClr val="accent6">
+                      <a:lumMod val="50000"/>
+                    </a:schemeClr>
+                  </a:solidFill>
+                </a:rPr>
+                <a:t>next_state = “GAME_OVER”</a:t>
+              </a:r>
+            </a:p>
+            <a:p>
+              <a:pPr marL="114300" indent="-57150">
+                <a:buFont typeface="Arial" panose="020B0604020202020204" pitchFamily="34" charset="0"/>
+                <a:buChar char="•"/>
+              </a:pPr>
+              <a:r>
+                <a:rPr lang="en-US" sz="500" noProof="1">
+                  <a:solidFill>
+                    <a:schemeClr val="accent6">
+                      <a:lumMod val="50000"/>
+                    </a:schemeClr>
+                  </a:solidFill>
+                </a:rPr>
+                <a:t>current_level: int: 1</a:t>
+              </a:r>
+            </a:p>
+            <a:p>
+              <a:pPr marL="114300" indent="-57150">
+                <a:buFont typeface="Arial" panose="020B0604020202020204" pitchFamily="34" charset="0"/>
+                <a:buChar char="•"/>
+              </a:pPr>
+              <a:r>
+                <a:rPr lang="en-US" sz="500" b="1" noProof="1">
+                  <a:solidFill>
+                    <a:schemeClr val="accent6">
+                      <a:lumMod val="50000"/>
+                    </a:schemeClr>
+                  </a:solidFill>
+                </a:rPr>
+                <a:t>level = Level(current_level)</a:t>
+              </a:r>
+              <a:endParaRPr lang="en-US" sz="500" b="1" noProof="1">
+                <a:solidFill>
+                  <a:schemeClr val="tx1"/>
+                </a:solidFill>
+              </a:endParaRPr>
+            </a:p>
+            <a:p>
+              <a:pPr marL="114300" indent="-57150">
+                <a:buFont typeface="Arial" panose="020B0604020202020204" pitchFamily="34" charset="0"/>
+                <a:buChar char="•"/>
+              </a:pPr>
+              <a:endParaRPr lang="en-US" sz="500" noProof="1">
+                <a:solidFill>
+                  <a:schemeClr val="accent6">
+                    <a:lumMod val="50000"/>
+                  </a:schemeClr>
+                </a:solidFill>
+              </a:endParaRPr>
+            </a:p>
+          </p:txBody>
+        </p:sp>
+        <p:sp>
+          <p:nvSpPr>
+            <p:cNvPr id="5" name="Rectangle 4">
+              <a:extLst>
+                <a:ext uri="{FF2B5EF4-FFF2-40B4-BE49-F238E27FC236}">
+                  <a16:creationId xmlns:a16="http://schemas.microsoft.com/office/drawing/2014/main" id="{B1110325-CE98-5207-C867-24990C2C745A}"/>
+                </a:ext>
+              </a:extLst>
+            </p:cNvPr>
+            <p:cNvSpPr/>
+            <p:nvPr/>
+          </p:nvSpPr>
+          <p:spPr>
+            <a:xfrm>
+              <a:off x="15766181" y="22183824"/>
+              <a:ext cx="6097606" cy="4750066"/>
+            </a:xfrm>
+            <a:prstGeom prst="rect">
+              <a:avLst/>
+            </a:prstGeom>
+            <a:noFill/>
+          </p:spPr>
+          <p:style>
+            <a:lnRef idx="2">
+              <a:schemeClr val="accent3">
+                <a:shade val="15000"/>
+              </a:schemeClr>
+            </a:lnRef>
+            <a:fillRef idx="1">
+              <a:schemeClr val="accent3"/>
+            </a:fillRef>
+            <a:effectRef idx="0">
+              <a:schemeClr val="accent3"/>
+            </a:effectRef>
+            <a:fontRef idx="minor">
+              <a:schemeClr val="lt1"/>
+            </a:fontRef>
+          </p:style>
+          <p:txBody>
+            <a:bodyPr lIns="0" rIns="0" rtlCol="0" anchor="t" anchorCtr="0">
+              <a:noAutofit/>
+            </a:bodyPr>
+            <a:lstStyle/>
+            <a:p>
+              <a:pPr marL="114300" indent="-57150">
+                <a:buFont typeface="Arial" panose="020B0604020202020204" pitchFamily="34" charset="0"/>
+                <a:buChar char="•"/>
+              </a:pPr>
+              <a:r>
+                <a:rPr lang="en-US" sz="600" noProof="1">
+                  <a:solidFill>
+                    <a:schemeClr val="tx1"/>
+                  </a:solidFill>
+                </a:rPr>
+                <a:t>get_joysticks()</a:t>
+              </a:r>
+            </a:p>
+            <a:p>
+              <a:pPr marL="114300" indent="-57150">
+                <a:buFont typeface="Arial" panose="020B0604020202020204" pitchFamily="34" charset="0"/>
+                <a:buChar char="•"/>
+              </a:pPr>
+              <a:r>
+                <a:rPr lang="en-US" sz="600" noProof="1">
+                  <a:solidFill>
+                    <a:schemeClr val="accent6">
+                      <a:lumMod val="50000"/>
+                    </a:schemeClr>
+                  </a:solidFill>
+                </a:rPr>
+                <a:t>get_event() calls </a:t>
+              </a:r>
+              <a:r>
+                <a:rPr lang="en-US" sz="600" b="1" noProof="1">
+                  <a:solidFill>
+                    <a:schemeClr val="accent6">
+                      <a:lumMod val="50000"/>
+                    </a:schemeClr>
+                  </a:solidFill>
+                </a:rPr>
+                <a:t>level</a:t>
+              </a:r>
+            </a:p>
+            <a:p>
+              <a:pPr marL="114300" indent="-57150">
+                <a:buFont typeface="Arial" panose="020B0604020202020204" pitchFamily="34" charset="0"/>
+                <a:buChar char="•"/>
+              </a:pPr>
+              <a:r>
+                <a:rPr lang="en-US" sz="600" noProof="1">
+                  <a:solidFill>
+                    <a:schemeClr val="tx1"/>
+                  </a:solidFill>
+                </a:rPr>
+                <a:t>startup()</a:t>
+              </a:r>
+            </a:p>
+            <a:p>
+              <a:pPr marL="114300" indent="-57150">
+                <a:buFont typeface="Arial" panose="020B0604020202020204" pitchFamily="34" charset="0"/>
+                <a:buChar char="•"/>
+              </a:pPr>
+              <a:r>
+                <a:rPr lang="en-US" sz="600" noProof="1">
+                  <a:solidFill>
+                    <a:schemeClr val="accent6">
+                      <a:lumMod val="50000"/>
+                    </a:schemeClr>
+                  </a:solidFill>
+                </a:rPr>
+                <a:t>update() calls </a:t>
+              </a:r>
+              <a:r>
+                <a:rPr lang="en-US" sz="600" b="1" noProof="1">
+                  <a:solidFill>
+                    <a:schemeClr val="accent6">
+                      <a:lumMod val="50000"/>
+                    </a:schemeClr>
+                  </a:solidFill>
+                </a:rPr>
+                <a:t>level</a:t>
+              </a:r>
+            </a:p>
+            <a:p>
+              <a:pPr marL="114300" indent="-57150">
+                <a:buFont typeface="Arial" panose="020B0604020202020204" pitchFamily="34" charset="0"/>
+                <a:buChar char="•"/>
+              </a:pPr>
+              <a:r>
+                <a:rPr lang="en-US" sz="600" noProof="1">
+                  <a:solidFill>
+                    <a:schemeClr val="accent6">
+                      <a:lumMod val="50000"/>
+                    </a:schemeClr>
+                  </a:solidFill>
+                </a:rPr>
+                <a:t>draw() calls </a:t>
+              </a:r>
+              <a:r>
+                <a:rPr lang="en-US" sz="600" b="1" noProof="1">
+                  <a:solidFill>
+                    <a:schemeClr val="accent6">
+                      <a:lumMod val="50000"/>
+                    </a:schemeClr>
+                  </a:solidFill>
+                </a:rPr>
+                <a:t>level</a:t>
+              </a:r>
+            </a:p>
+            <a:p>
+              <a:pPr marL="114300" indent="-57150">
+                <a:buFont typeface="Arial" panose="020B0604020202020204" pitchFamily="34" charset="0"/>
+                <a:buChar char="•"/>
+              </a:pPr>
+              <a:endParaRPr lang="en-US" sz="600" noProof="1">
+                <a:solidFill>
+                  <a:schemeClr val="accent6">
+                    <a:lumMod val="50000"/>
+                  </a:schemeClr>
+                </a:solidFill>
+              </a:endParaRPr>
+            </a:p>
+            <a:p>
+              <a:pPr marL="114300" indent="-57150">
+                <a:buFont typeface="Arial" panose="020B0604020202020204" pitchFamily="34" charset="0"/>
+                <a:buChar char="•"/>
+              </a:pPr>
+              <a:endParaRPr lang="en-US" sz="600" noProof="1">
+                <a:solidFill>
+                  <a:schemeClr val="accent6">
+                    <a:lumMod val="50000"/>
+                  </a:schemeClr>
+                </a:solidFill>
+              </a:endParaRPr>
+            </a:p>
+            <a:p>
+              <a:pPr marL="114300" indent="-57150">
+                <a:buFont typeface="Arial" panose="020B0604020202020204" pitchFamily="34" charset="0"/>
+                <a:buChar char="•"/>
+              </a:pPr>
+              <a:endParaRPr lang="en-US" sz="300" noProof="1">
+                <a:solidFill>
+                  <a:schemeClr val="accent6">
+                    <a:lumMod val="50000"/>
+                  </a:schemeClr>
+                </a:solidFill>
+              </a:endParaRPr>
+            </a:p>
+          </p:txBody>
+        </p:sp>
+      </p:grpSp>
+      <p:cxnSp>
+        <p:nvCxnSpPr>
+          <p:cNvPr id="7" name="Straight Arrow Connector 6">
+            <a:extLst>
+              <a:ext uri="{FF2B5EF4-FFF2-40B4-BE49-F238E27FC236}">
+                <a16:creationId xmlns:a16="http://schemas.microsoft.com/office/drawing/2014/main" id="{C708132F-563F-8CB9-E22D-31CC1AB0A43B}"/>
+              </a:ext>
+            </a:extLst>
+          </p:cNvPr>
+          <p:cNvCxnSpPr/>
+          <p:nvPr/>
+        </p:nvCxnSpPr>
+        <p:spPr>
+          <a:xfrm>
+            <a:off x="1462064" y="3583886"/>
+            <a:ext cx="381000" cy="0"/>
+          </a:xfrm>
+          <a:prstGeom prst="straightConnector1">
+            <a:avLst/>
+          </a:prstGeom>
+          <a:ln>
+            <a:tailEnd type="triangle"/>
+          </a:ln>
+        </p:spPr>
+        <p:style>
+          <a:lnRef idx="1">
+            <a:schemeClr val="accent1"/>
+          </a:lnRef>
+          <a:fillRef idx="0">
+            <a:schemeClr val="accent1"/>
+          </a:fillRef>
+          <a:effectRef idx="0">
+            <a:schemeClr val="accent1"/>
+          </a:effectRef>
+          <a:fontRef idx="minor">
+            <a:schemeClr val="tx1"/>
+          </a:fontRef>
+        </p:style>
+      </p:cxnSp>
+      <p:cxnSp>
+        <p:nvCxnSpPr>
+          <p:cNvPr id="8" name="Straight Arrow Connector 7">
+            <a:extLst>
+              <a:ext uri="{FF2B5EF4-FFF2-40B4-BE49-F238E27FC236}">
+                <a16:creationId xmlns:a16="http://schemas.microsoft.com/office/drawing/2014/main" id="{C19C57DB-C41B-91BF-274C-B5885F7DA25E}"/>
+              </a:ext>
+            </a:extLst>
+          </p:cNvPr>
+          <p:cNvCxnSpPr/>
+          <p:nvPr/>
+        </p:nvCxnSpPr>
+        <p:spPr>
+          <a:xfrm>
+            <a:off x="1461438" y="3784110"/>
+            <a:ext cx="381000" cy="0"/>
+          </a:xfrm>
+          <a:prstGeom prst="straightConnector1">
+            <a:avLst/>
+          </a:prstGeom>
+          <a:ln>
+            <a:tailEnd type="triangle"/>
+          </a:ln>
+        </p:spPr>
+        <p:style>
+          <a:lnRef idx="1">
+            <a:schemeClr val="accent1"/>
+          </a:lnRef>
+          <a:fillRef idx="0">
+            <a:schemeClr val="accent1"/>
+          </a:fillRef>
+          <a:effectRef idx="0">
+            <a:schemeClr val="accent1"/>
+          </a:effectRef>
+          <a:fontRef idx="minor">
+            <a:schemeClr val="tx1"/>
+          </a:fontRef>
+        </p:style>
+      </p:cxnSp>
+      <p:cxnSp>
+        <p:nvCxnSpPr>
+          <p:cNvPr id="9" name="Straight Arrow Connector 8">
+            <a:extLst>
+              <a:ext uri="{FF2B5EF4-FFF2-40B4-BE49-F238E27FC236}">
+                <a16:creationId xmlns:a16="http://schemas.microsoft.com/office/drawing/2014/main" id="{A1982849-6F59-9086-99A7-C7FD900E7F69}"/>
+              </a:ext>
+            </a:extLst>
+          </p:cNvPr>
+          <p:cNvCxnSpPr/>
+          <p:nvPr/>
+        </p:nvCxnSpPr>
+        <p:spPr>
+          <a:xfrm>
+            <a:off x="1461438" y="3877919"/>
+            <a:ext cx="381000" cy="0"/>
+          </a:xfrm>
+          <a:prstGeom prst="straightConnector1">
+            <a:avLst/>
+          </a:prstGeom>
+          <a:ln>
+            <a:tailEnd type="triangle"/>
+          </a:ln>
+        </p:spPr>
+        <p:style>
+          <a:lnRef idx="1">
+            <a:schemeClr val="accent1"/>
+          </a:lnRef>
+          <a:fillRef idx="0">
+            <a:schemeClr val="accent1"/>
+          </a:fillRef>
+          <a:effectRef idx="0">
+            <a:schemeClr val="accent1"/>
+          </a:effectRef>
+          <a:fontRef idx="minor">
+            <a:schemeClr val="tx1"/>
+          </a:fontRef>
+        </p:style>
+      </p:cxnSp>
+      <p:cxnSp>
+        <p:nvCxnSpPr>
+          <p:cNvPr id="10" name="Straight Arrow Connector 9">
+            <a:extLst>
+              <a:ext uri="{FF2B5EF4-FFF2-40B4-BE49-F238E27FC236}">
+                <a16:creationId xmlns:a16="http://schemas.microsoft.com/office/drawing/2014/main" id="{57A606D9-FF69-8A67-62A0-ACCF1158B07E}"/>
+              </a:ext>
+            </a:extLst>
+          </p:cNvPr>
+          <p:cNvCxnSpPr>
+            <a:cxnSpLocks/>
+          </p:cNvCxnSpPr>
+          <p:nvPr/>
+        </p:nvCxnSpPr>
+        <p:spPr>
+          <a:xfrm>
+            <a:off x="1494748" y="3282603"/>
+            <a:ext cx="348316" cy="0"/>
+          </a:xfrm>
+          <a:prstGeom prst="straightConnector1">
+            <a:avLst/>
+          </a:prstGeom>
+          <a:ln w="38100">
+            <a:tailEnd type="triangle"/>
+          </a:ln>
+        </p:spPr>
+        <p:style>
+          <a:lnRef idx="1">
+            <a:schemeClr val="accent1"/>
+          </a:lnRef>
+          <a:fillRef idx="0">
+            <a:schemeClr val="accent1"/>
+          </a:fillRef>
+          <a:effectRef idx="0">
+            <a:schemeClr val="accent1"/>
+          </a:effectRef>
+          <a:fontRef idx="minor">
+            <a:schemeClr val="tx1"/>
+          </a:fontRef>
+        </p:style>
+      </p:cxnSp>
+      <p:cxnSp>
+        <p:nvCxnSpPr>
+          <p:cNvPr id="13" name="Straight Arrow Connector 12">
+            <a:extLst>
+              <a:ext uri="{FF2B5EF4-FFF2-40B4-BE49-F238E27FC236}">
+                <a16:creationId xmlns:a16="http://schemas.microsoft.com/office/drawing/2014/main" id="{E24B20A3-6223-0CEA-D7F0-C4C33417BB30}"/>
+              </a:ext>
+            </a:extLst>
+          </p:cNvPr>
+          <p:cNvCxnSpPr>
+            <a:cxnSpLocks/>
+          </p:cNvCxnSpPr>
+          <p:nvPr/>
+        </p:nvCxnSpPr>
+        <p:spPr>
+          <a:xfrm>
+            <a:off x="2724150" y="3594070"/>
+            <a:ext cx="402593" cy="263979"/>
+          </a:xfrm>
+          <a:prstGeom prst="straightConnector1">
+            <a:avLst/>
+          </a:prstGeom>
+          <a:ln>
+            <a:tailEnd type="triangle"/>
+          </a:ln>
+        </p:spPr>
+        <p:style>
+          <a:lnRef idx="1">
+            <a:schemeClr val="accent1"/>
+          </a:lnRef>
+          <a:fillRef idx="0">
+            <a:schemeClr val="accent1"/>
+          </a:fillRef>
+          <a:effectRef idx="0">
+            <a:schemeClr val="accent1"/>
+          </a:effectRef>
+          <a:fontRef idx="minor">
+            <a:schemeClr val="tx1"/>
+          </a:fontRef>
+        </p:style>
+      </p:cxnSp>
+      <p:cxnSp>
+        <p:nvCxnSpPr>
+          <p:cNvPr id="16" name="Straight Arrow Connector 15">
+            <a:extLst>
+              <a:ext uri="{FF2B5EF4-FFF2-40B4-BE49-F238E27FC236}">
+                <a16:creationId xmlns:a16="http://schemas.microsoft.com/office/drawing/2014/main" id="{99AA6995-E490-F072-E5DD-21A3FF8D0491}"/>
+              </a:ext>
+            </a:extLst>
+          </p:cNvPr>
+          <p:cNvCxnSpPr>
+            <a:cxnSpLocks/>
+          </p:cNvCxnSpPr>
+          <p:nvPr/>
+        </p:nvCxnSpPr>
+        <p:spPr>
+          <a:xfrm>
+            <a:off x="2669378" y="3784110"/>
+            <a:ext cx="452438" cy="166384"/>
+          </a:xfrm>
+          <a:prstGeom prst="straightConnector1">
+            <a:avLst/>
+          </a:prstGeom>
+          <a:ln>
+            <a:tailEnd type="triangle"/>
+          </a:ln>
+        </p:spPr>
+        <p:style>
+          <a:lnRef idx="1">
+            <a:schemeClr val="accent1"/>
+          </a:lnRef>
+          <a:fillRef idx="0">
+            <a:schemeClr val="accent1"/>
+          </a:fillRef>
+          <a:effectRef idx="0">
+            <a:schemeClr val="accent1"/>
+          </a:effectRef>
+          <a:fontRef idx="minor">
+            <a:schemeClr val="tx1"/>
+          </a:fontRef>
+        </p:style>
+      </p:cxnSp>
+      <p:cxnSp>
+        <p:nvCxnSpPr>
+          <p:cNvPr id="19" name="Straight Arrow Connector 18">
+            <a:extLst>
+              <a:ext uri="{FF2B5EF4-FFF2-40B4-BE49-F238E27FC236}">
+                <a16:creationId xmlns:a16="http://schemas.microsoft.com/office/drawing/2014/main" id="{26D6E124-B89A-55E0-DA66-812C07CB649C}"/>
+              </a:ext>
+            </a:extLst>
+          </p:cNvPr>
+          <p:cNvCxnSpPr>
+            <a:cxnSpLocks/>
+          </p:cNvCxnSpPr>
+          <p:nvPr/>
+        </p:nvCxnSpPr>
+        <p:spPr>
+          <a:xfrm>
+            <a:off x="2678234" y="3867302"/>
+            <a:ext cx="452438" cy="166384"/>
+          </a:xfrm>
+          <a:prstGeom prst="straightConnector1">
+            <a:avLst/>
+          </a:prstGeom>
+          <a:ln>
+            <a:tailEnd type="triangle"/>
+          </a:ln>
         </p:spPr>
         <p:style>
           <a:lnRef idx="1">

</xml_diff>